<commit_message>
Test case for xmlAdaptedExpenses
</commit_message>
<xml_diff>
--- a/docs/diagrams/StorageComponentClassDiagram.pptx
+++ b/docs/diagrams/StorageComponentClassDiagram.pptx
@@ -107,6 +107,22 @@
       </a:defRPr>
     </a:lvl9pPr>
   </p:defaultTextStyle>
+  <p:extLst>
+    <p:ext uri="{EFAFB233-063F-42B5-8137-9DF3F51BA10A}">
+      <p15:sldGuideLst xmlns:p15="http://schemas.microsoft.com/office/powerpoint/2012/main">
+        <p15:guide id="1" orient="horz" pos="1488">
+          <p15:clr>
+            <a:srgbClr val="A4A3A4"/>
+          </p15:clr>
+        </p15:guide>
+        <p15:guide id="2" pos="2880">
+          <p15:clr>
+            <a:srgbClr val="A4A3A4"/>
+          </p15:clr>
+        </p15:guide>
+      </p15:sldGuideLst>
+    </p:ext>
+  </p:extLst>
 </p:presentation>
 </file>
 
@@ -192,7 +208,7 @@
           <a:p>
             <a:fld id="{F5CC4B3F-88C1-4FFA-B1B6-F41C21DC6924}" type="datetimeFigureOut">
               <a:rPr lang="en-US" smtClean="0"/>
-              <a:t>10/16/2016</a:t>
+              <a:t>11/8/2018</a:t>
             </a:fld>
             <a:endParaRPr lang="en-US"/>
           </a:p>
@@ -256,38 +272,37 @@
           <a:p>
             <a:pPr lvl="0"/>
             <a:r>
-              <a:rPr lang="en-US" smtClean="0"/>
+              <a:rPr lang="en-US"/>
               <a:t>Click to edit Master text styles</a:t>
             </a:r>
           </a:p>
           <a:p>
             <a:pPr lvl="1"/>
             <a:r>
-              <a:rPr lang="en-US" smtClean="0"/>
+              <a:rPr lang="en-US"/>
               <a:t>Second level</a:t>
             </a:r>
           </a:p>
           <a:p>
             <a:pPr lvl="2"/>
             <a:r>
-              <a:rPr lang="en-US" smtClean="0"/>
+              <a:rPr lang="en-US"/>
               <a:t>Third level</a:t>
             </a:r>
           </a:p>
           <a:p>
             <a:pPr lvl="3"/>
             <a:r>
-              <a:rPr lang="en-US" smtClean="0"/>
+              <a:rPr lang="en-US"/>
               <a:t>Fourth level</a:t>
             </a:r>
           </a:p>
           <a:p>
             <a:pPr lvl="4"/>
             <a:r>
-              <a:rPr lang="en-US" smtClean="0"/>
+              <a:rPr lang="en-US"/>
               <a:t>Fifth level</a:t>
             </a:r>
-            <a:endParaRPr lang="en-US"/>
           </a:p>
         </p:txBody>
       </p:sp>
@@ -498,10 +513,9 @@
           <a:lstStyle/>
           <a:p>
             <a:r>
-              <a:rPr lang="en-US" smtClean="0"/>
+              <a:rPr lang="en-US"/>
               <a:t>Click to edit Master title style</a:t>
             </a:r>
-            <a:endParaRPr lang="en-US"/>
           </a:p>
         </p:txBody>
       </p:sp>
@@ -617,10 +631,9 @@
           </a:lstStyle>
           <a:p>
             <a:r>
-              <a:rPr lang="en-US" smtClean="0"/>
+              <a:rPr lang="en-US"/>
               <a:t>Click to edit Master subtitle style</a:t>
             </a:r>
-            <a:endParaRPr lang="en-US"/>
           </a:p>
         </p:txBody>
       </p:sp>
@@ -641,7 +654,7 @@
           <a:p>
             <a:fld id="{78C97017-6FC3-485B-9764-EAC9E56C1D49}" type="datetimeFigureOut">
               <a:rPr lang="en-US" smtClean="0"/>
-              <a:t>10/16/2016</a:t>
+              <a:t>11/8/2018</a:t>
             </a:fld>
             <a:endParaRPr lang="en-US"/>
           </a:p>
@@ -735,10 +748,9 @@
           <a:lstStyle/>
           <a:p>
             <a:r>
-              <a:rPr lang="en-US" smtClean="0"/>
+              <a:rPr lang="en-US"/>
               <a:t>Click to edit Master title style</a:t>
             </a:r>
-            <a:endParaRPr lang="en-US"/>
           </a:p>
         </p:txBody>
       </p:sp>
@@ -759,38 +771,37 @@
           <a:p>
             <a:pPr lvl="0"/>
             <a:r>
-              <a:rPr lang="en-US" smtClean="0"/>
+              <a:rPr lang="en-US"/>
               <a:t>Click to edit Master text styles</a:t>
             </a:r>
           </a:p>
           <a:p>
             <a:pPr lvl="1"/>
             <a:r>
-              <a:rPr lang="en-US" smtClean="0"/>
+              <a:rPr lang="en-US"/>
               <a:t>Second level</a:t>
             </a:r>
           </a:p>
           <a:p>
             <a:pPr lvl="2"/>
             <a:r>
-              <a:rPr lang="en-US" smtClean="0"/>
+              <a:rPr lang="en-US"/>
               <a:t>Third level</a:t>
             </a:r>
           </a:p>
           <a:p>
             <a:pPr lvl="3"/>
             <a:r>
-              <a:rPr lang="en-US" smtClean="0"/>
+              <a:rPr lang="en-US"/>
               <a:t>Fourth level</a:t>
             </a:r>
           </a:p>
           <a:p>
             <a:pPr lvl="4"/>
             <a:r>
-              <a:rPr lang="en-US" smtClean="0"/>
+              <a:rPr lang="en-US"/>
               <a:t>Fifth level</a:t>
             </a:r>
-            <a:endParaRPr lang="en-US"/>
           </a:p>
         </p:txBody>
       </p:sp>
@@ -811,7 +822,7 @@
           <a:p>
             <a:fld id="{78C97017-6FC3-485B-9764-EAC9E56C1D49}" type="datetimeFigureOut">
               <a:rPr lang="en-US" smtClean="0"/>
-              <a:t>10/16/2016</a:t>
+              <a:t>11/8/2018</a:t>
             </a:fld>
             <a:endParaRPr lang="en-US"/>
           </a:p>
@@ -910,10 +921,9 @@
           <a:lstStyle/>
           <a:p>
             <a:r>
-              <a:rPr lang="en-US" smtClean="0"/>
+              <a:rPr lang="en-US"/>
               <a:t>Click to edit Master title style</a:t>
             </a:r>
-            <a:endParaRPr lang="en-US"/>
           </a:p>
         </p:txBody>
       </p:sp>
@@ -939,38 +949,37 @@
           <a:p>
             <a:pPr lvl="0"/>
             <a:r>
-              <a:rPr lang="en-US" smtClean="0"/>
+              <a:rPr lang="en-US"/>
               <a:t>Click to edit Master text styles</a:t>
             </a:r>
           </a:p>
           <a:p>
             <a:pPr lvl="1"/>
             <a:r>
-              <a:rPr lang="en-US" smtClean="0"/>
+              <a:rPr lang="en-US"/>
               <a:t>Second level</a:t>
             </a:r>
           </a:p>
           <a:p>
             <a:pPr lvl="2"/>
             <a:r>
-              <a:rPr lang="en-US" smtClean="0"/>
+              <a:rPr lang="en-US"/>
               <a:t>Third level</a:t>
             </a:r>
           </a:p>
           <a:p>
             <a:pPr lvl="3"/>
             <a:r>
-              <a:rPr lang="en-US" smtClean="0"/>
+              <a:rPr lang="en-US"/>
               <a:t>Fourth level</a:t>
             </a:r>
           </a:p>
           <a:p>
             <a:pPr lvl="4"/>
             <a:r>
-              <a:rPr lang="en-US" smtClean="0"/>
+              <a:rPr lang="en-US"/>
               <a:t>Fifth level</a:t>
             </a:r>
-            <a:endParaRPr lang="en-US"/>
           </a:p>
         </p:txBody>
       </p:sp>
@@ -991,7 +1000,7 @@
           <a:p>
             <a:fld id="{78C97017-6FC3-485B-9764-EAC9E56C1D49}" type="datetimeFigureOut">
               <a:rPr lang="en-US" smtClean="0"/>
-              <a:t>10/16/2016</a:t>
+              <a:t>11/8/2018</a:t>
             </a:fld>
             <a:endParaRPr lang="en-US"/>
           </a:p>
@@ -1085,10 +1094,9 @@
           <a:lstStyle/>
           <a:p>
             <a:r>
-              <a:rPr lang="en-US" smtClean="0"/>
+              <a:rPr lang="en-US"/>
               <a:t>Click to edit Master title style</a:t>
             </a:r>
-            <a:endParaRPr lang="en-US"/>
           </a:p>
         </p:txBody>
       </p:sp>
@@ -1109,38 +1117,37 @@
           <a:p>
             <a:pPr lvl="0"/>
             <a:r>
-              <a:rPr lang="en-US" smtClean="0"/>
+              <a:rPr lang="en-US"/>
               <a:t>Click to edit Master text styles</a:t>
             </a:r>
           </a:p>
           <a:p>
             <a:pPr lvl="1"/>
             <a:r>
-              <a:rPr lang="en-US" smtClean="0"/>
+              <a:rPr lang="en-US"/>
               <a:t>Second level</a:t>
             </a:r>
           </a:p>
           <a:p>
             <a:pPr lvl="2"/>
             <a:r>
-              <a:rPr lang="en-US" smtClean="0"/>
+              <a:rPr lang="en-US"/>
               <a:t>Third level</a:t>
             </a:r>
           </a:p>
           <a:p>
             <a:pPr lvl="3"/>
             <a:r>
-              <a:rPr lang="en-US" smtClean="0"/>
+              <a:rPr lang="en-US"/>
               <a:t>Fourth level</a:t>
             </a:r>
           </a:p>
           <a:p>
             <a:pPr lvl="4"/>
             <a:r>
-              <a:rPr lang="en-US" smtClean="0"/>
+              <a:rPr lang="en-US"/>
               <a:t>Fifth level</a:t>
             </a:r>
-            <a:endParaRPr lang="en-US"/>
           </a:p>
         </p:txBody>
       </p:sp>
@@ -1161,7 +1168,7 @@
           <a:p>
             <a:fld id="{78C97017-6FC3-485B-9764-EAC9E56C1D49}" type="datetimeFigureOut">
               <a:rPr lang="en-US" smtClean="0"/>
-              <a:t>10/16/2016</a:t>
+              <a:t>11/8/2018</a:t>
             </a:fld>
             <a:endParaRPr lang="en-US"/>
           </a:p>
@@ -1264,10 +1271,9 @@
           </a:lstStyle>
           <a:p>
             <a:r>
-              <a:rPr lang="en-US" smtClean="0"/>
+              <a:rPr lang="en-US"/>
               <a:t>Click to edit Master title style</a:t>
             </a:r>
-            <a:endParaRPr lang="en-US"/>
           </a:p>
         </p:txBody>
       </p:sp>
@@ -1384,7 +1390,7 @@
           <a:p>
             <a:pPr lvl="0"/>
             <a:r>
-              <a:rPr lang="en-US" smtClean="0"/>
+              <a:rPr lang="en-US"/>
               <a:t>Click to edit Master text styles</a:t>
             </a:r>
           </a:p>
@@ -1407,7 +1413,7 @@
           <a:p>
             <a:fld id="{78C97017-6FC3-485B-9764-EAC9E56C1D49}" type="datetimeFigureOut">
               <a:rPr lang="en-US" smtClean="0"/>
-              <a:t>10/16/2016</a:t>
+              <a:t>11/8/2018</a:t>
             </a:fld>
             <a:endParaRPr lang="en-US"/>
           </a:p>
@@ -1501,10 +1507,9 @@
           <a:lstStyle/>
           <a:p>
             <a:r>
-              <a:rPr lang="en-US" smtClean="0"/>
+              <a:rPr lang="en-US"/>
               <a:t>Click to edit Master title style</a:t>
             </a:r>
-            <a:endParaRPr lang="en-US"/>
           </a:p>
         </p:txBody>
       </p:sp>
@@ -1558,38 +1563,37 @@
           <a:p>
             <a:pPr lvl="0"/>
             <a:r>
-              <a:rPr lang="en-US" smtClean="0"/>
+              <a:rPr lang="en-US"/>
               <a:t>Click to edit Master text styles</a:t>
             </a:r>
           </a:p>
           <a:p>
             <a:pPr lvl="1"/>
             <a:r>
-              <a:rPr lang="en-US" smtClean="0"/>
+              <a:rPr lang="en-US"/>
               <a:t>Second level</a:t>
             </a:r>
           </a:p>
           <a:p>
             <a:pPr lvl="2"/>
             <a:r>
-              <a:rPr lang="en-US" smtClean="0"/>
+              <a:rPr lang="en-US"/>
               <a:t>Third level</a:t>
             </a:r>
           </a:p>
           <a:p>
             <a:pPr lvl="3"/>
             <a:r>
-              <a:rPr lang="en-US" smtClean="0"/>
+              <a:rPr lang="en-US"/>
               <a:t>Fourth level</a:t>
             </a:r>
           </a:p>
           <a:p>
             <a:pPr lvl="4"/>
             <a:r>
-              <a:rPr lang="en-US" smtClean="0"/>
+              <a:rPr lang="en-US"/>
               <a:t>Fifth level</a:t>
             </a:r>
-            <a:endParaRPr lang="en-US"/>
           </a:p>
         </p:txBody>
       </p:sp>
@@ -1643,38 +1647,37 @@
           <a:p>
             <a:pPr lvl="0"/>
             <a:r>
-              <a:rPr lang="en-US" smtClean="0"/>
+              <a:rPr lang="en-US"/>
               <a:t>Click to edit Master text styles</a:t>
             </a:r>
           </a:p>
           <a:p>
             <a:pPr lvl="1"/>
             <a:r>
-              <a:rPr lang="en-US" smtClean="0"/>
+              <a:rPr lang="en-US"/>
               <a:t>Second level</a:t>
             </a:r>
           </a:p>
           <a:p>
             <a:pPr lvl="2"/>
             <a:r>
-              <a:rPr lang="en-US" smtClean="0"/>
+              <a:rPr lang="en-US"/>
               <a:t>Third level</a:t>
             </a:r>
           </a:p>
           <a:p>
             <a:pPr lvl="3"/>
             <a:r>
-              <a:rPr lang="en-US" smtClean="0"/>
+              <a:rPr lang="en-US"/>
               <a:t>Fourth level</a:t>
             </a:r>
           </a:p>
           <a:p>
             <a:pPr lvl="4"/>
             <a:r>
-              <a:rPr lang="en-US" smtClean="0"/>
+              <a:rPr lang="en-US"/>
               <a:t>Fifth level</a:t>
             </a:r>
-            <a:endParaRPr lang="en-US"/>
           </a:p>
         </p:txBody>
       </p:sp>
@@ -1695,7 +1698,7 @@
           <a:p>
             <a:fld id="{78C97017-6FC3-485B-9764-EAC9E56C1D49}" type="datetimeFigureOut">
               <a:rPr lang="en-US" smtClean="0"/>
-              <a:t>10/16/2016</a:t>
+              <a:t>11/8/2018</a:t>
             </a:fld>
             <a:endParaRPr lang="en-US"/>
           </a:p>
@@ -1793,10 +1796,9 @@
           </a:lstStyle>
           <a:p>
             <a:r>
-              <a:rPr lang="en-US" smtClean="0"/>
+              <a:rPr lang="en-US"/>
               <a:t>Click to edit Master title style</a:t>
             </a:r>
-            <a:endParaRPr lang="en-US"/>
           </a:p>
         </p:txBody>
       </p:sp>
@@ -1859,7 +1861,7 @@
           <a:p>
             <a:pPr lvl="0"/>
             <a:r>
-              <a:rPr lang="en-US" smtClean="0"/>
+              <a:rPr lang="en-US"/>
               <a:t>Click to edit Master text styles</a:t>
             </a:r>
           </a:p>
@@ -1915,38 +1917,37 @@
           <a:p>
             <a:pPr lvl="0"/>
             <a:r>
-              <a:rPr lang="en-US" smtClean="0"/>
+              <a:rPr lang="en-US"/>
               <a:t>Click to edit Master text styles</a:t>
             </a:r>
           </a:p>
           <a:p>
             <a:pPr lvl="1"/>
             <a:r>
-              <a:rPr lang="en-US" smtClean="0"/>
+              <a:rPr lang="en-US"/>
               <a:t>Second level</a:t>
             </a:r>
           </a:p>
           <a:p>
             <a:pPr lvl="2"/>
             <a:r>
-              <a:rPr lang="en-US" smtClean="0"/>
+              <a:rPr lang="en-US"/>
               <a:t>Third level</a:t>
             </a:r>
           </a:p>
           <a:p>
             <a:pPr lvl="3"/>
             <a:r>
-              <a:rPr lang="en-US" smtClean="0"/>
+              <a:rPr lang="en-US"/>
               <a:t>Fourth level</a:t>
             </a:r>
           </a:p>
           <a:p>
             <a:pPr lvl="4"/>
             <a:r>
-              <a:rPr lang="en-US" smtClean="0"/>
+              <a:rPr lang="en-US"/>
               <a:t>Fifth level</a:t>
             </a:r>
-            <a:endParaRPr lang="en-US"/>
           </a:p>
         </p:txBody>
       </p:sp>
@@ -2009,7 +2010,7 @@
           <a:p>
             <a:pPr lvl="0"/>
             <a:r>
-              <a:rPr lang="en-US" smtClean="0"/>
+              <a:rPr lang="en-US"/>
               <a:t>Click to edit Master text styles</a:t>
             </a:r>
           </a:p>
@@ -2065,38 +2066,37 @@
           <a:p>
             <a:pPr lvl="0"/>
             <a:r>
-              <a:rPr lang="en-US" smtClean="0"/>
+              <a:rPr lang="en-US"/>
               <a:t>Click to edit Master text styles</a:t>
             </a:r>
           </a:p>
           <a:p>
             <a:pPr lvl="1"/>
             <a:r>
-              <a:rPr lang="en-US" smtClean="0"/>
+              <a:rPr lang="en-US"/>
               <a:t>Second level</a:t>
             </a:r>
           </a:p>
           <a:p>
             <a:pPr lvl="2"/>
             <a:r>
-              <a:rPr lang="en-US" smtClean="0"/>
+              <a:rPr lang="en-US"/>
               <a:t>Third level</a:t>
             </a:r>
           </a:p>
           <a:p>
             <a:pPr lvl="3"/>
             <a:r>
-              <a:rPr lang="en-US" smtClean="0"/>
+              <a:rPr lang="en-US"/>
               <a:t>Fourth level</a:t>
             </a:r>
           </a:p>
           <a:p>
             <a:pPr lvl="4"/>
             <a:r>
-              <a:rPr lang="en-US" smtClean="0"/>
+              <a:rPr lang="en-US"/>
               <a:t>Fifth level</a:t>
             </a:r>
-            <a:endParaRPr lang="en-US"/>
           </a:p>
         </p:txBody>
       </p:sp>
@@ -2117,7 +2117,7 @@
           <a:p>
             <a:fld id="{78C97017-6FC3-485B-9764-EAC9E56C1D49}" type="datetimeFigureOut">
               <a:rPr lang="en-US" smtClean="0"/>
-              <a:t>10/16/2016</a:t>
+              <a:t>11/8/2018</a:t>
             </a:fld>
             <a:endParaRPr lang="en-US"/>
           </a:p>
@@ -2211,10 +2211,9 @@
           <a:lstStyle/>
           <a:p>
             <a:r>
-              <a:rPr lang="en-US" smtClean="0"/>
+              <a:rPr lang="en-US"/>
               <a:t>Click to edit Master title style</a:t>
             </a:r>
-            <a:endParaRPr lang="en-US"/>
           </a:p>
         </p:txBody>
       </p:sp>
@@ -2235,7 +2234,7 @@
           <a:p>
             <a:fld id="{78C97017-6FC3-485B-9764-EAC9E56C1D49}" type="datetimeFigureOut">
               <a:rPr lang="en-US" smtClean="0"/>
-              <a:t>10/16/2016</a:t>
+              <a:t>11/8/2018</a:t>
             </a:fld>
             <a:endParaRPr lang="en-US"/>
           </a:p>
@@ -2330,7 +2329,7 @@
           <a:p>
             <a:fld id="{78C97017-6FC3-485B-9764-EAC9E56C1D49}" type="datetimeFigureOut">
               <a:rPr lang="en-US" smtClean="0"/>
-              <a:t>10/16/2016</a:t>
+              <a:t>11/8/2018</a:t>
             </a:fld>
             <a:endParaRPr lang="en-US"/>
           </a:p>
@@ -2433,10 +2432,9 @@
           </a:lstStyle>
           <a:p>
             <a:r>
-              <a:rPr lang="en-US" smtClean="0"/>
+              <a:rPr lang="en-US"/>
               <a:t>Click to edit Master title style</a:t>
             </a:r>
-            <a:endParaRPr lang="en-US"/>
           </a:p>
         </p:txBody>
       </p:sp>
@@ -2490,38 +2488,37 @@
           <a:p>
             <a:pPr lvl="0"/>
             <a:r>
-              <a:rPr lang="en-US" smtClean="0"/>
+              <a:rPr lang="en-US"/>
               <a:t>Click to edit Master text styles</a:t>
             </a:r>
           </a:p>
           <a:p>
             <a:pPr lvl="1"/>
             <a:r>
-              <a:rPr lang="en-US" smtClean="0"/>
+              <a:rPr lang="en-US"/>
               <a:t>Second level</a:t>
             </a:r>
           </a:p>
           <a:p>
             <a:pPr lvl="2"/>
             <a:r>
-              <a:rPr lang="en-US" smtClean="0"/>
+              <a:rPr lang="en-US"/>
               <a:t>Third level</a:t>
             </a:r>
           </a:p>
           <a:p>
             <a:pPr lvl="3"/>
             <a:r>
-              <a:rPr lang="en-US" smtClean="0"/>
+              <a:rPr lang="en-US"/>
               <a:t>Fourth level</a:t>
             </a:r>
           </a:p>
           <a:p>
             <a:pPr lvl="4"/>
             <a:r>
-              <a:rPr lang="en-US" smtClean="0"/>
+              <a:rPr lang="en-US"/>
               <a:t>Fifth level</a:t>
             </a:r>
-            <a:endParaRPr lang="en-US"/>
           </a:p>
         </p:txBody>
       </p:sp>
@@ -2584,7 +2581,7 @@
           <a:p>
             <a:pPr lvl="0"/>
             <a:r>
-              <a:rPr lang="en-US" smtClean="0"/>
+              <a:rPr lang="en-US"/>
               <a:t>Click to edit Master text styles</a:t>
             </a:r>
           </a:p>
@@ -2607,7 +2604,7 @@
           <a:p>
             <a:fld id="{78C97017-6FC3-485B-9764-EAC9E56C1D49}" type="datetimeFigureOut">
               <a:rPr lang="en-US" smtClean="0"/>
-              <a:t>10/16/2016</a:t>
+              <a:t>11/8/2018</a:t>
             </a:fld>
             <a:endParaRPr lang="en-US"/>
           </a:p>
@@ -2710,10 +2707,9 @@
           </a:lstStyle>
           <a:p>
             <a:r>
-              <a:rPr lang="en-US" smtClean="0"/>
+              <a:rPr lang="en-US"/>
               <a:t>Click to edit Master title style</a:t>
             </a:r>
-            <a:endParaRPr lang="en-US"/>
           </a:p>
         </p:txBody>
       </p:sp>
@@ -2837,7 +2833,7 @@
           <a:p>
             <a:pPr lvl="0"/>
             <a:r>
-              <a:rPr lang="en-US" smtClean="0"/>
+              <a:rPr lang="en-US"/>
               <a:t>Click to edit Master text styles</a:t>
             </a:r>
           </a:p>
@@ -2860,7 +2856,7 @@
           <a:p>
             <a:fld id="{78C97017-6FC3-485B-9764-EAC9E56C1D49}" type="datetimeFigureOut">
               <a:rPr lang="en-US" smtClean="0"/>
-              <a:t>10/16/2016</a:t>
+              <a:t>11/8/2018</a:t>
             </a:fld>
             <a:endParaRPr lang="en-US"/>
           </a:p>
@@ -2969,10 +2965,9 @@
           <a:lstStyle/>
           <a:p>
             <a:r>
-              <a:rPr lang="en-US" smtClean="0"/>
+              <a:rPr lang="en-US"/>
               <a:t>Click to edit Master title style</a:t>
             </a:r>
-            <a:endParaRPr lang="en-US"/>
           </a:p>
         </p:txBody>
       </p:sp>
@@ -3003,38 +2998,37 @@
           <a:p>
             <a:pPr lvl="0"/>
             <a:r>
-              <a:rPr lang="en-US" smtClean="0"/>
+              <a:rPr lang="en-US"/>
               <a:t>Click to edit Master text styles</a:t>
             </a:r>
           </a:p>
           <a:p>
             <a:pPr lvl="1"/>
             <a:r>
-              <a:rPr lang="en-US" smtClean="0"/>
+              <a:rPr lang="en-US"/>
               <a:t>Second level</a:t>
             </a:r>
           </a:p>
           <a:p>
             <a:pPr lvl="2"/>
             <a:r>
-              <a:rPr lang="en-US" smtClean="0"/>
+              <a:rPr lang="en-US"/>
               <a:t>Third level</a:t>
             </a:r>
           </a:p>
           <a:p>
             <a:pPr lvl="3"/>
             <a:r>
-              <a:rPr lang="en-US" smtClean="0"/>
+              <a:rPr lang="en-US"/>
               <a:t>Fourth level</a:t>
             </a:r>
           </a:p>
           <a:p>
             <a:pPr lvl="4"/>
             <a:r>
-              <a:rPr lang="en-US" smtClean="0"/>
+              <a:rPr lang="en-US"/>
               <a:t>Fifth level</a:t>
             </a:r>
-            <a:endParaRPr lang="en-US"/>
           </a:p>
         </p:txBody>
       </p:sp>
@@ -3073,7 +3067,7 @@
           <a:p>
             <a:fld id="{78C97017-6FC3-485B-9764-EAC9E56C1D49}" type="datetimeFigureOut">
               <a:rPr lang="en-US" smtClean="0"/>
-              <a:t>10/16/2016</a:t>
+              <a:t>11/8/2018</a:t>
             </a:fld>
             <a:endParaRPr lang="en-US"/>
           </a:p>
@@ -3456,8 +3450,8 @@
         </p:nvSpPr>
         <p:spPr>
           <a:xfrm>
-            <a:off x="1119865" y="2086382"/>
-            <a:ext cx="7871735" cy="1723618"/>
+            <a:off x="819374" y="2086382"/>
+            <a:ext cx="8024135" cy="3775298"/>
           </a:xfrm>
           <a:prstGeom prst="roundRect">
             <a:avLst>
@@ -3494,7 +3488,7 @@
           <a:lstStyle/>
           <a:p>
             <a:r>
-              <a:rPr lang="en-US" sz="1200" b="1" dirty="0" smtClean="0">
+              <a:rPr lang="en-US" sz="1200" b="1" dirty="0">
                 <a:solidFill>
                   <a:schemeClr val="accent6">
                     <a:lumMod val="75000"/>
@@ -3521,7 +3515,7 @@
         </p:nvSpPr>
         <p:spPr>
           <a:xfrm>
-            <a:off x="2877180" y="3158440"/>
+            <a:off x="2576689" y="3158440"/>
             <a:ext cx="1323049" cy="346760"/>
           </a:xfrm>
           <a:prstGeom prst="rect">
@@ -3561,7 +3555,7 @@
           <a:p>
             <a:pPr algn="ctr"/>
             <a:r>
-              <a:rPr lang="en-US" sz="1050" dirty="0" smtClean="0">
+              <a:rPr lang="en-US" sz="1050" dirty="0">
                 <a:solidFill>
                   <a:schemeClr val="bg1"/>
                 </a:solidFill>
@@ -3569,14 +3563,14 @@
               <a:t>&lt;&lt;interface&gt;&gt;</a:t>
             </a:r>
             <a:br>
-              <a:rPr lang="en-US" sz="1050" dirty="0" smtClean="0">
+              <a:rPr lang="en-US" sz="1050" dirty="0">
                 <a:solidFill>
                   <a:schemeClr val="bg1"/>
                 </a:solidFill>
               </a:rPr>
             </a:br>
             <a:r>
-              <a:rPr lang="en-US" sz="1050" dirty="0" err="1" smtClean="0">
+              <a:rPr lang="en-US" sz="1050" dirty="0" err="1">
                 <a:solidFill>
                   <a:schemeClr val="bg1"/>
                 </a:solidFill>
@@ -3599,8 +3593,8 @@
         </p:nvSpPr>
         <p:spPr>
           <a:xfrm rot="16200000">
-            <a:off x="1683963" y="2868687"/>
-            <a:ext cx="1093635" cy="346760"/>
+            <a:off x="472818" y="3779344"/>
+            <a:ext cx="2914949" cy="346760"/>
           </a:xfrm>
           <a:prstGeom prst="rect">
             <a:avLst/>
@@ -3639,7 +3633,7 @@
           <a:p>
             <a:pPr algn="ctr"/>
             <a:r>
-              <a:rPr lang="en-US" sz="1050" dirty="0" err="1" smtClean="0">
+              <a:rPr lang="en-US" sz="1050" dirty="0" err="1">
                 <a:solidFill>
                   <a:schemeClr val="bg1"/>
                 </a:solidFill>
@@ -3662,7 +3656,7 @@
         </p:nvSpPr>
         <p:spPr>
           <a:xfrm rot="16200000">
-            <a:off x="956202" y="2861202"/>
+            <a:off x="655711" y="2861202"/>
             <a:ext cx="1093635" cy="346760"/>
           </a:xfrm>
           <a:prstGeom prst="rect">
@@ -3713,7 +3707,7 @@
           <a:p>
             <a:pPr algn="ctr"/>
             <a:r>
-              <a:rPr lang="en-US" sz="1050" dirty="0" smtClean="0">
+              <a:rPr lang="en-US" sz="1050" dirty="0">
                 <a:solidFill>
                   <a:schemeClr val="bg1"/>
                 </a:solidFill>
@@ -3736,7 +3730,7 @@
         </p:nvSpPr>
         <p:spPr>
           <a:xfrm rot="16200000">
-            <a:off x="1626910" y="2952291"/>
+            <a:off x="1326419" y="2952291"/>
             <a:ext cx="270504" cy="175523"/>
           </a:xfrm>
           <a:prstGeom prst="triangle">
@@ -3794,7 +3788,7 @@
         </p:nvCxnSpPr>
         <p:spPr>
           <a:xfrm>
-            <a:off x="2656370" y="3326536"/>
+            <a:off x="2355879" y="3326536"/>
             <a:ext cx="220810" cy="5284"/>
           </a:xfrm>
           <a:prstGeom prst="straightConnector1">
@@ -3834,7 +3828,7 @@
         </p:nvCxnSpPr>
         <p:spPr>
           <a:xfrm>
-            <a:off x="910091" y="3040053"/>
+            <a:off x="609600" y="3040053"/>
             <a:ext cx="419548" cy="2860"/>
           </a:xfrm>
           <a:prstGeom prst="bentConnector3">
@@ -3879,7 +3873,7 @@
         </p:nvCxnSpPr>
         <p:spPr>
           <a:xfrm flipV="1">
-            <a:off x="1849924" y="3040052"/>
+            <a:off x="1549433" y="3040052"/>
             <a:ext cx="216105" cy="1"/>
           </a:xfrm>
           <a:prstGeom prst="line">
@@ -3920,7 +3914,7 @@
         </p:nvSpPr>
         <p:spPr>
           <a:xfrm>
-            <a:off x="2420322" y="3239846"/>
+            <a:off x="2119831" y="3239846"/>
             <a:ext cx="236048" cy="173380"/>
           </a:xfrm>
           <a:prstGeom prst="flowChartDecision">
@@ -3974,7 +3968,7 @@
         </p:nvCxnSpPr>
         <p:spPr>
           <a:xfrm flipV="1">
-            <a:off x="4398041" y="3331820"/>
+            <a:off x="4097550" y="3331820"/>
             <a:ext cx="223324" cy="1"/>
           </a:xfrm>
           <a:prstGeom prst="bentConnector3">
@@ -4017,7 +4011,7 @@
         </p:nvSpPr>
         <p:spPr>
           <a:xfrm rot="5400000" flipV="1">
-            <a:off x="4175027" y="3244059"/>
+            <a:off x="3874536" y="3244059"/>
             <a:ext cx="270504" cy="175523"/>
           </a:xfrm>
           <a:prstGeom prst="triangle">
@@ -4075,7 +4069,7 @@
         </p:nvCxnSpPr>
         <p:spPr>
           <a:xfrm>
-            <a:off x="5791200" y="3331820"/>
+            <a:off x="5490709" y="3331820"/>
             <a:ext cx="228600" cy="1970"/>
           </a:xfrm>
           <a:prstGeom prst="bentConnector3">
@@ -4118,7 +4112,7 @@
         </p:nvSpPr>
         <p:spPr>
           <a:xfrm>
-            <a:off x="4621365" y="3158440"/>
+            <a:off x="4320874" y="3158440"/>
             <a:ext cx="1169835" cy="346760"/>
           </a:xfrm>
           <a:prstGeom prst="rect">
@@ -4147,7 +4141,7 @@
           <a:p>
             <a:pPr algn="ctr"/>
             <a:r>
-              <a:rPr lang="en-US" sz="1050" b="1" dirty="0" err="1" smtClean="0">
+              <a:rPr lang="en-US" sz="1050" b="1" dirty="0" err="1">
                 <a:solidFill>
                   <a:schemeClr val="accent6">
                     <a:lumMod val="75000"/>
@@ -4156,18 +4150,8 @@
               </a:rPr>
               <a:t>XmlAddressBook</a:t>
             </a:r>
-            <a:r>
-              <a:rPr lang="en-US" sz="1050" b="1" dirty="0" smtClean="0">
-                <a:solidFill>
-                  <a:schemeClr val="accent6">
-                    <a:lumMod val="75000"/>
-                  </a:schemeClr>
-                </a:solidFill>
-              </a:rPr>
-              <a:t/>
-            </a:r>
             <a:br>
-              <a:rPr lang="en-US" sz="1050" b="1" dirty="0" smtClean="0">
+              <a:rPr lang="en-US" sz="1050" b="1" dirty="0">
                 <a:solidFill>
                   <a:schemeClr val="accent6">
                     <a:lumMod val="75000"/>
@@ -4176,7 +4160,7 @@
               </a:rPr>
             </a:br>
             <a:r>
-              <a:rPr lang="en-US" sz="1050" b="1" dirty="0" smtClean="0">
+              <a:rPr lang="en-US" sz="1050" b="1" dirty="0">
                 <a:solidFill>
                   <a:schemeClr val="accent6">
                     <a:lumMod val="75000"/>
@@ -4203,7 +4187,7 @@
         </p:nvSpPr>
         <p:spPr>
           <a:xfrm>
-            <a:off x="2873943" y="2558040"/>
+            <a:off x="2573452" y="2558040"/>
             <a:ext cx="1323049" cy="346760"/>
           </a:xfrm>
           <a:prstGeom prst="rect">
@@ -4243,7 +4227,7 @@
           <a:p>
             <a:pPr algn="ctr"/>
             <a:r>
-              <a:rPr lang="en-US" sz="1050" dirty="0" smtClean="0">
+              <a:rPr lang="en-US" sz="1050" dirty="0">
                 <a:solidFill>
                   <a:schemeClr val="bg1"/>
                 </a:solidFill>
@@ -4251,14 +4235,14 @@
               <a:t>&lt;&lt;interface&gt;&gt;</a:t>
             </a:r>
             <a:br>
-              <a:rPr lang="en-US" sz="1050" dirty="0" smtClean="0">
+              <a:rPr lang="en-US" sz="1050" dirty="0">
                 <a:solidFill>
                   <a:schemeClr val="bg1"/>
                 </a:solidFill>
               </a:rPr>
             </a:br>
             <a:r>
-              <a:rPr lang="en-US" sz="1050" dirty="0" err="1" smtClean="0">
+              <a:rPr lang="en-US" sz="1050" dirty="0" err="1">
                 <a:solidFill>
                   <a:schemeClr val="bg1"/>
                 </a:solidFill>
@@ -4284,7 +4268,7 @@
         </p:nvCxnSpPr>
         <p:spPr>
           <a:xfrm>
-            <a:off x="2653133" y="2726136"/>
+            <a:off x="2352642" y="2726136"/>
             <a:ext cx="220810" cy="5284"/>
           </a:xfrm>
           <a:prstGeom prst="straightConnector1">
@@ -4324,7 +4308,7 @@
         </p:nvSpPr>
         <p:spPr>
           <a:xfrm>
-            <a:off x="2417085" y="2639446"/>
+            <a:off x="2116594" y="2639446"/>
             <a:ext cx="236048" cy="173380"/>
           </a:xfrm>
           <a:prstGeom prst="flowChartDecision">
@@ -4378,7 +4362,7 @@
         </p:nvCxnSpPr>
         <p:spPr>
           <a:xfrm flipV="1">
-            <a:off x="4394804" y="2731420"/>
+            <a:off x="4094313" y="2731420"/>
             <a:ext cx="223324" cy="1"/>
           </a:xfrm>
           <a:prstGeom prst="bentConnector3">
@@ -4421,7 +4405,7 @@
         </p:nvSpPr>
         <p:spPr>
           <a:xfrm rot="5400000" flipV="1">
-            <a:off x="4171790" y="2643659"/>
+            <a:off x="3871299" y="2643659"/>
             <a:ext cx="270504" cy="175523"/>
           </a:xfrm>
           <a:prstGeom prst="triangle">
@@ -4476,7 +4460,7 @@
         </p:nvSpPr>
         <p:spPr>
           <a:xfrm>
-            <a:off x="4618128" y="2558040"/>
+            <a:off x="4317637" y="2558040"/>
             <a:ext cx="1093635" cy="346760"/>
           </a:xfrm>
           <a:prstGeom prst="rect">
@@ -4516,30 +4500,22 @@
           <a:p>
             <a:pPr algn="ctr"/>
             <a:r>
-              <a:rPr lang="en-US" sz="1050" dirty="0" err="1" smtClean="0">
+              <a:rPr lang="en-US" sz="1050" dirty="0" err="1">
                 <a:solidFill>
                   <a:schemeClr val="bg1"/>
                 </a:solidFill>
               </a:rPr>
               <a:t>JsonUserPrefs</a:t>
             </a:r>
-            <a:r>
-              <a:rPr lang="en-US" sz="1050" dirty="0" smtClean="0">
-                <a:solidFill>
-                  <a:schemeClr val="bg1"/>
-                </a:solidFill>
-              </a:rPr>
-              <a:t/>
-            </a:r>
             <a:br>
-              <a:rPr lang="en-US" sz="1050" dirty="0" smtClean="0">
+              <a:rPr lang="en-US" sz="1050" dirty="0">
                 <a:solidFill>
                   <a:schemeClr val="bg1"/>
                 </a:solidFill>
               </a:rPr>
             </a:br>
             <a:r>
-              <a:rPr lang="en-US" sz="1050" dirty="0" smtClean="0">
+              <a:rPr lang="en-US" sz="1050" dirty="0">
                 <a:solidFill>
                   <a:schemeClr val="bg1"/>
                 </a:solidFill>
@@ -4562,7 +4538,7 @@
         </p:nvSpPr>
         <p:spPr>
           <a:xfrm>
-            <a:off x="6019800" y="3160410"/>
+            <a:off x="5719309" y="3160410"/>
             <a:ext cx="1200707" cy="346760"/>
           </a:xfrm>
           <a:prstGeom prst="rect">
@@ -4591,7 +4567,7 @@
           <a:p>
             <a:pPr algn="ctr"/>
             <a:r>
-              <a:rPr lang="en-US" sz="1050" b="1" dirty="0" err="1" smtClean="0">
+              <a:rPr lang="en-US" sz="1050" b="1" dirty="0" err="1">
                 <a:solidFill>
                   <a:schemeClr val="accent6">
                     <a:lumMod val="75000"/>
@@ -4600,18 +4576,8 @@
               </a:rPr>
               <a:t>XmlSerializable</a:t>
             </a:r>
-            <a:r>
-              <a:rPr lang="en-US" sz="1050" b="1" dirty="0" smtClean="0">
-                <a:solidFill>
-                  <a:schemeClr val="accent6">
-                    <a:lumMod val="75000"/>
-                  </a:schemeClr>
-                </a:solidFill>
-              </a:rPr>
-              <a:t/>
-            </a:r>
             <a:br>
-              <a:rPr lang="en-US" sz="1050" b="1" dirty="0" smtClean="0">
+              <a:rPr lang="en-US" sz="1050" b="1" dirty="0">
                 <a:solidFill>
                   <a:schemeClr val="accent6">
                     <a:lumMod val="75000"/>
@@ -4620,7 +4586,7 @@
               </a:rPr>
             </a:br>
             <a:r>
-              <a:rPr lang="en-US" sz="1050" b="1" dirty="0" err="1" smtClean="0">
+              <a:rPr lang="en-US" sz="1050" b="1" dirty="0" err="1">
                 <a:solidFill>
                   <a:schemeClr val="accent6">
                     <a:lumMod val="75000"/>
@@ -4650,7 +4616,7 @@
         </p:nvCxnSpPr>
         <p:spPr>
           <a:xfrm rot="5400000" flipH="1" flipV="1">
-            <a:off x="8077993" y="2992020"/>
+            <a:off x="7777502" y="2992020"/>
             <a:ext cx="335208" cy="12700"/>
           </a:xfrm>
           <a:prstGeom prst="bentConnector3">
@@ -4688,7 +4654,7 @@
         </p:nvSpPr>
         <p:spPr>
           <a:xfrm>
-            <a:off x="7615738" y="2477656"/>
+            <a:off x="7315247" y="2477656"/>
             <a:ext cx="1259718" cy="346760"/>
           </a:xfrm>
           <a:prstGeom prst="rect">
@@ -4717,7 +4683,7 @@
           <a:p>
             <a:pPr algn="ctr"/>
             <a:r>
-              <a:rPr lang="en-US" sz="1050" b="1" dirty="0" err="1" smtClean="0">
+              <a:rPr lang="en-US" sz="1050" b="1" dirty="0" err="1">
                 <a:solidFill>
                   <a:schemeClr val="accent6">
                     <a:lumMod val="75000"/>
@@ -4744,7 +4710,7 @@
         </p:nvSpPr>
         <p:spPr>
           <a:xfrm>
-            <a:off x="7615738" y="3159624"/>
+            <a:off x="7315247" y="3159624"/>
             <a:ext cx="1259718" cy="346760"/>
           </a:xfrm>
           <a:prstGeom prst="rect">
@@ -4773,7 +4739,7 @@
           <a:p>
             <a:pPr algn="ctr"/>
             <a:r>
-              <a:rPr lang="en-US" sz="1050" b="1" dirty="0" err="1" smtClean="0">
+              <a:rPr lang="en-US" sz="1050" b="1" dirty="0" err="1">
                 <a:solidFill>
                   <a:schemeClr val="accent6">
                     <a:lumMod val="75000"/>
@@ -4803,8 +4769,1890 @@
         </p:nvCxnSpPr>
         <p:spPr>
           <a:xfrm flipV="1">
-            <a:off x="7220507" y="3333004"/>
+            <a:off x="6920016" y="3333004"/>
             <a:ext cx="395231" cy="786"/>
+          </a:xfrm>
+          <a:prstGeom prst="bentConnector3">
+            <a:avLst>
+              <a:gd name="adj1" fmla="val 50000"/>
+            </a:avLst>
+          </a:prstGeom>
+          <a:ln w="19050">
+            <a:prstDash val="sysDot"/>
+            <a:headEnd type="none" w="med" len="med"/>
+            <a:tailEnd type="arrow" w="med" len="med"/>
+          </a:ln>
+          <a:effectLst/>
+        </p:spPr>
+        <p:style>
+          <a:lnRef idx="1">
+            <a:schemeClr val="accent6"/>
+          </a:lnRef>
+          <a:fillRef idx="2">
+            <a:schemeClr val="accent6"/>
+          </a:fillRef>
+          <a:effectRef idx="1">
+            <a:schemeClr val="accent6"/>
+          </a:effectRef>
+          <a:fontRef idx="minor">
+            <a:schemeClr val="dk1"/>
+          </a:fontRef>
+        </p:style>
+      </p:cxnSp>
+      <p:sp>
+        <p:nvSpPr>
+          <p:cNvPr id="26" name="Rectangle 8">
+            <a:extLst>
+              <a:ext uri="{FF2B5EF4-FFF2-40B4-BE49-F238E27FC236}">
+                <a16:creationId xmlns:a16="http://schemas.microsoft.com/office/drawing/2014/main" id="{60585560-907C-4A37-8E3D-BACC8216689E}"/>
+              </a:ext>
+            </a:extLst>
+          </p:cNvPr>
+          <p:cNvSpPr/>
+          <p:nvPr/>
+        </p:nvSpPr>
+        <p:spPr>
+          <a:xfrm>
+            <a:off x="2594767" y="3810000"/>
+            <a:ext cx="1323049" cy="346760"/>
+          </a:xfrm>
+          <a:prstGeom prst="rect">
+            <a:avLst/>
+          </a:prstGeom>
+          <a:solidFill>
+            <a:schemeClr val="accent6">
+              <a:lumMod val="75000"/>
+            </a:schemeClr>
+          </a:solidFill>
+          <a:ln w="19050">
+            <a:solidFill>
+              <a:schemeClr val="accent6">
+                <a:lumMod val="75000"/>
+              </a:schemeClr>
+            </a:solidFill>
+          </a:ln>
+          <a:effectLst/>
+        </p:spPr>
+        <p:style>
+          <a:lnRef idx="1">
+            <a:schemeClr val="accent2"/>
+          </a:lnRef>
+          <a:fillRef idx="2">
+            <a:schemeClr val="accent2"/>
+          </a:fillRef>
+          <a:effectRef idx="1">
+            <a:schemeClr val="accent2"/>
+          </a:effectRef>
+          <a:fontRef idx="minor">
+            <a:schemeClr val="dk1"/>
+          </a:fontRef>
+        </p:style>
+        <p:txBody>
+          <a:bodyPr rtlCol="0" anchor="ctr"/>
+          <a:lstStyle/>
+          <a:p>
+            <a:pPr algn="ctr"/>
+            <a:r>
+              <a:rPr lang="en-US" sz="1050" dirty="0">
+                <a:solidFill>
+                  <a:schemeClr val="bg1"/>
+                </a:solidFill>
+              </a:rPr>
+              <a:t>&lt;&lt;interface&gt;&gt;</a:t>
+            </a:r>
+            <a:br>
+              <a:rPr lang="en-US" sz="1050" dirty="0">
+                <a:solidFill>
+                  <a:schemeClr val="bg1"/>
+                </a:solidFill>
+              </a:rPr>
+            </a:br>
+            <a:r>
+              <a:rPr lang="en-US" sz="1050" dirty="0" err="1">
+                <a:solidFill>
+                  <a:schemeClr val="bg1"/>
+                </a:solidFill>
+              </a:rPr>
+              <a:t>ExpensesListStorage</a:t>
+            </a:r>
+            <a:endParaRPr lang="en-SG" sz="1050" dirty="0">
+              <a:solidFill>
+                <a:schemeClr val="bg1"/>
+              </a:solidFill>
+            </a:endParaRPr>
+          </a:p>
+        </p:txBody>
+      </p:sp>
+      <p:cxnSp>
+        <p:nvCxnSpPr>
+          <p:cNvPr id="27" name="Straight Arrow Connector 26">
+            <a:extLst>
+              <a:ext uri="{FF2B5EF4-FFF2-40B4-BE49-F238E27FC236}">
+                <a16:creationId xmlns:a16="http://schemas.microsoft.com/office/drawing/2014/main" id="{4752EDF5-D752-4EB7-8F41-CFE3CAEB8D9E}"/>
+              </a:ext>
+            </a:extLst>
+          </p:cNvPr>
+          <p:cNvCxnSpPr>
+            <a:stCxn id="28" idx="3"/>
+            <a:endCxn id="26" idx="1"/>
+          </p:cNvCxnSpPr>
+          <p:nvPr/>
+        </p:nvCxnSpPr>
+        <p:spPr>
+          <a:xfrm>
+            <a:off x="2373957" y="3978096"/>
+            <a:ext cx="220810" cy="5284"/>
+          </a:xfrm>
+          <a:prstGeom prst="straightConnector1">
+            <a:avLst/>
+          </a:prstGeom>
+          <a:ln w="19050">
+            <a:solidFill>
+              <a:schemeClr val="accent6">
+                <a:lumMod val="75000"/>
+              </a:schemeClr>
+            </a:solidFill>
+            <a:headEnd type="none" w="med" len="med"/>
+            <a:tailEnd type="arrow" w="med" len="med"/>
+          </a:ln>
+          <a:effectLst/>
+        </p:spPr>
+        <p:style>
+          <a:lnRef idx="1">
+            <a:schemeClr val="accent2"/>
+          </a:lnRef>
+          <a:fillRef idx="2">
+            <a:schemeClr val="accent2"/>
+          </a:fillRef>
+          <a:effectRef idx="1">
+            <a:schemeClr val="accent2"/>
+          </a:effectRef>
+          <a:fontRef idx="minor">
+            <a:schemeClr val="dk1"/>
+          </a:fontRef>
+        </p:style>
+      </p:cxnSp>
+      <p:sp>
+        <p:nvSpPr>
+          <p:cNvPr id="28" name="Flowchart: Decision 96">
+            <a:extLst>
+              <a:ext uri="{FF2B5EF4-FFF2-40B4-BE49-F238E27FC236}">
+                <a16:creationId xmlns:a16="http://schemas.microsoft.com/office/drawing/2014/main" id="{E7E93799-ED9C-4796-BD18-7EE0066CA29D}"/>
+              </a:ext>
+            </a:extLst>
+          </p:cNvPr>
+          <p:cNvSpPr/>
+          <p:nvPr/>
+        </p:nvSpPr>
+        <p:spPr>
+          <a:xfrm>
+            <a:off x="2137909" y="3891406"/>
+            <a:ext cx="236048" cy="173380"/>
+          </a:xfrm>
+          <a:prstGeom prst="flowChartDecision">
+            <a:avLst/>
+          </a:prstGeom>
+          <a:noFill/>
+          <a:ln w="19050">
+            <a:solidFill>
+              <a:schemeClr val="accent6">
+                <a:lumMod val="75000"/>
+              </a:schemeClr>
+            </a:solidFill>
+          </a:ln>
+          <a:effectLst/>
+        </p:spPr>
+        <p:style>
+          <a:lnRef idx="1">
+            <a:schemeClr val="accent2"/>
+          </a:lnRef>
+          <a:fillRef idx="2">
+            <a:schemeClr val="accent2"/>
+          </a:fillRef>
+          <a:effectRef idx="1">
+            <a:schemeClr val="accent2"/>
+          </a:effectRef>
+          <a:fontRef idx="minor">
+            <a:schemeClr val="dk1"/>
+          </a:fontRef>
+        </p:style>
+        <p:txBody>
+          <a:bodyPr rtlCol="0" anchor="ctr"/>
+          <a:lstStyle/>
+          <a:p>
+            <a:pPr algn="ctr"/>
+            <a:endParaRPr lang="en-US" sz="1050">
+              <a:solidFill>
+                <a:schemeClr val="bg1"/>
+              </a:solidFill>
+            </a:endParaRPr>
+          </a:p>
+        </p:txBody>
+      </p:sp>
+      <p:cxnSp>
+        <p:nvCxnSpPr>
+          <p:cNvPr id="29" name="Elbow Connector 63">
+            <a:extLst>
+              <a:ext uri="{FF2B5EF4-FFF2-40B4-BE49-F238E27FC236}">
+                <a16:creationId xmlns:a16="http://schemas.microsoft.com/office/drawing/2014/main" id="{E5B114EC-2085-41C0-A251-38442C0D3DA8}"/>
+              </a:ext>
+            </a:extLst>
+          </p:cNvPr>
+          <p:cNvCxnSpPr>
+            <a:stCxn id="30" idx="3"/>
+            <a:endCxn id="32" idx="1"/>
+          </p:cNvCxnSpPr>
+          <p:nvPr/>
+        </p:nvCxnSpPr>
+        <p:spPr>
+          <a:xfrm flipV="1">
+            <a:off x="4115628" y="3983380"/>
+            <a:ext cx="223324" cy="1"/>
+          </a:xfrm>
+          <a:prstGeom prst="bentConnector3">
+            <a:avLst>
+              <a:gd name="adj1" fmla="val 50000"/>
+            </a:avLst>
+          </a:prstGeom>
+          <a:ln w="19050">
+            <a:solidFill>
+              <a:schemeClr val="accent6">
+                <a:lumMod val="75000"/>
+              </a:schemeClr>
+            </a:solidFill>
+            <a:prstDash val="sysDot"/>
+            <a:headEnd type="none" w="med" len="med"/>
+            <a:tailEnd type="none" w="med" len="med"/>
+          </a:ln>
+          <a:effectLst/>
+        </p:spPr>
+        <p:style>
+          <a:lnRef idx="1">
+            <a:schemeClr val="accent2"/>
+          </a:lnRef>
+          <a:fillRef idx="2">
+            <a:schemeClr val="accent2"/>
+          </a:fillRef>
+          <a:effectRef idx="1">
+            <a:schemeClr val="accent2"/>
+          </a:effectRef>
+          <a:fontRef idx="minor">
+            <a:schemeClr val="dk1"/>
+          </a:fontRef>
+        </p:style>
+      </p:cxnSp>
+      <p:sp>
+        <p:nvSpPr>
+          <p:cNvPr id="30" name="Isosceles Triangle 102">
+            <a:extLst>
+              <a:ext uri="{FF2B5EF4-FFF2-40B4-BE49-F238E27FC236}">
+                <a16:creationId xmlns:a16="http://schemas.microsoft.com/office/drawing/2014/main" id="{F8FF36F6-5E61-435B-8ECF-91F6D8A45547}"/>
+              </a:ext>
+            </a:extLst>
+          </p:cNvPr>
+          <p:cNvSpPr/>
+          <p:nvPr/>
+        </p:nvSpPr>
+        <p:spPr>
+          <a:xfrm rot="5400000" flipV="1">
+            <a:off x="3892614" y="3895619"/>
+            <a:ext cx="270504" cy="175523"/>
+          </a:xfrm>
+          <a:prstGeom prst="triangle">
+            <a:avLst/>
+          </a:prstGeom>
+          <a:solidFill>
+            <a:schemeClr val="accent6">
+              <a:lumMod val="75000"/>
+            </a:schemeClr>
+          </a:solidFill>
+          <a:ln w="19050">
+            <a:solidFill>
+              <a:schemeClr val="accent6">
+                <a:lumMod val="75000"/>
+              </a:schemeClr>
+            </a:solidFill>
+          </a:ln>
+          <a:effectLst/>
+        </p:spPr>
+        <p:style>
+          <a:lnRef idx="1">
+            <a:schemeClr val="accent2"/>
+          </a:lnRef>
+          <a:fillRef idx="2">
+            <a:schemeClr val="accent2"/>
+          </a:fillRef>
+          <a:effectRef idx="1">
+            <a:schemeClr val="accent2"/>
+          </a:effectRef>
+          <a:fontRef idx="minor">
+            <a:schemeClr val="dk1"/>
+          </a:fontRef>
+        </p:style>
+        <p:txBody>
+          <a:bodyPr rtlCol="0" anchor="ctr"/>
+          <a:lstStyle/>
+          <a:p>
+            <a:pPr algn="ctr"/>
+            <a:endParaRPr lang="en-SG" sz="1050">
+              <a:solidFill>
+                <a:schemeClr val="bg1"/>
+              </a:solidFill>
+            </a:endParaRPr>
+          </a:p>
+        </p:txBody>
+      </p:sp>
+      <p:cxnSp>
+        <p:nvCxnSpPr>
+          <p:cNvPr id="31" name="Elbow Connector 122">
+            <a:extLst>
+              <a:ext uri="{FF2B5EF4-FFF2-40B4-BE49-F238E27FC236}">
+                <a16:creationId xmlns:a16="http://schemas.microsoft.com/office/drawing/2014/main" id="{67FE1829-2990-42CE-A9B0-74FB2DB8056C}"/>
+              </a:ext>
+            </a:extLst>
+          </p:cNvPr>
+          <p:cNvCxnSpPr>
+            <a:stCxn id="32" idx="3"/>
+            <a:endCxn id="33" idx="1"/>
+          </p:cNvCxnSpPr>
+          <p:nvPr/>
+        </p:nvCxnSpPr>
+        <p:spPr>
+          <a:xfrm>
+            <a:off x="5508787" y="3983380"/>
+            <a:ext cx="228600" cy="1970"/>
+          </a:xfrm>
+          <a:prstGeom prst="bentConnector3">
+            <a:avLst>
+              <a:gd name="adj1" fmla="val 50000"/>
+            </a:avLst>
+          </a:prstGeom>
+          <a:ln w="19050">
+            <a:solidFill>
+              <a:schemeClr val="accent6">
+                <a:lumMod val="75000"/>
+              </a:schemeClr>
+            </a:solidFill>
+            <a:prstDash val="sysDot"/>
+            <a:headEnd type="none" w="med" len="med"/>
+            <a:tailEnd type="arrow" w="med" len="med"/>
+          </a:ln>
+          <a:effectLst/>
+        </p:spPr>
+        <p:style>
+          <a:lnRef idx="1">
+            <a:schemeClr val="accent2"/>
+          </a:lnRef>
+          <a:fillRef idx="2">
+            <a:schemeClr val="accent2"/>
+          </a:fillRef>
+          <a:effectRef idx="1">
+            <a:schemeClr val="accent2"/>
+          </a:effectRef>
+          <a:fontRef idx="minor">
+            <a:schemeClr val="dk1"/>
+          </a:fontRef>
+        </p:style>
+      </p:cxnSp>
+      <p:sp>
+        <p:nvSpPr>
+          <p:cNvPr id="32" name="Rectangle 8">
+            <a:extLst>
+              <a:ext uri="{FF2B5EF4-FFF2-40B4-BE49-F238E27FC236}">
+                <a16:creationId xmlns:a16="http://schemas.microsoft.com/office/drawing/2014/main" id="{DAC621C2-B580-48A7-AE43-017134D8049D}"/>
+              </a:ext>
+            </a:extLst>
+          </p:cNvPr>
+          <p:cNvSpPr/>
+          <p:nvPr/>
+        </p:nvSpPr>
+        <p:spPr>
+          <a:xfrm>
+            <a:off x="4338952" y="3810000"/>
+            <a:ext cx="1169835" cy="346760"/>
+          </a:xfrm>
+          <a:prstGeom prst="rect">
+            <a:avLst/>
+          </a:prstGeom>
+          <a:ln w="19050"/>
+          <a:effectLst/>
+        </p:spPr>
+        <p:style>
+          <a:lnRef idx="1">
+            <a:schemeClr val="accent6"/>
+          </a:lnRef>
+          <a:fillRef idx="2">
+            <a:schemeClr val="accent6"/>
+          </a:fillRef>
+          <a:effectRef idx="1">
+            <a:schemeClr val="accent6"/>
+          </a:effectRef>
+          <a:fontRef idx="minor">
+            <a:schemeClr val="dk1"/>
+          </a:fontRef>
+        </p:style>
+        <p:txBody>
+          <a:bodyPr rtlCol="0" anchor="ctr"/>
+          <a:lstStyle/>
+          <a:p>
+            <a:pPr algn="ctr"/>
+            <a:r>
+              <a:rPr lang="en-US" sz="1050" b="1" dirty="0" err="1">
+                <a:solidFill>
+                  <a:schemeClr val="accent6">
+                    <a:lumMod val="75000"/>
+                  </a:schemeClr>
+                </a:solidFill>
+              </a:rPr>
+              <a:t>XmlExpensesList</a:t>
+            </a:r>
+            <a:br>
+              <a:rPr lang="en-US" sz="1050" b="1" dirty="0">
+                <a:solidFill>
+                  <a:schemeClr val="accent6">
+                    <a:lumMod val="75000"/>
+                  </a:schemeClr>
+                </a:solidFill>
+              </a:rPr>
+            </a:br>
+            <a:r>
+              <a:rPr lang="en-US" sz="1050" b="1" dirty="0">
+                <a:solidFill>
+                  <a:schemeClr val="accent6">
+                    <a:lumMod val="75000"/>
+                  </a:schemeClr>
+                </a:solidFill>
+              </a:rPr>
+              <a:t>Storage</a:t>
+            </a:r>
+            <a:endParaRPr lang="en-SG" sz="1050" b="1" dirty="0">
+              <a:solidFill>
+                <a:schemeClr val="accent6">
+                  <a:lumMod val="75000"/>
+                </a:schemeClr>
+              </a:solidFill>
+            </a:endParaRPr>
+          </a:p>
+        </p:txBody>
+      </p:sp>
+      <p:sp>
+        <p:nvSpPr>
+          <p:cNvPr id="33" name="Rectangle 8">
+            <a:extLst>
+              <a:ext uri="{FF2B5EF4-FFF2-40B4-BE49-F238E27FC236}">
+                <a16:creationId xmlns:a16="http://schemas.microsoft.com/office/drawing/2014/main" id="{93DE6264-1661-47DB-8EF7-F2D99D207394}"/>
+              </a:ext>
+            </a:extLst>
+          </p:cNvPr>
+          <p:cNvSpPr/>
+          <p:nvPr/>
+        </p:nvSpPr>
+        <p:spPr>
+          <a:xfrm>
+            <a:off x="5737387" y="3811970"/>
+            <a:ext cx="1200707" cy="346760"/>
+          </a:xfrm>
+          <a:prstGeom prst="rect">
+            <a:avLst/>
+          </a:prstGeom>
+          <a:ln w="19050"/>
+          <a:effectLst/>
+        </p:spPr>
+        <p:style>
+          <a:lnRef idx="1">
+            <a:schemeClr val="accent6"/>
+          </a:lnRef>
+          <a:fillRef idx="2">
+            <a:schemeClr val="accent6"/>
+          </a:fillRef>
+          <a:effectRef idx="1">
+            <a:schemeClr val="accent6"/>
+          </a:effectRef>
+          <a:fontRef idx="minor">
+            <a:schemeClr val="dk1"/>
+          </a:fontRef>
+        </p:style>
+        <p:txBody>
+          <a:bodyPr rtlCol="0" anchor="ctr"/>
+          <a:lstStyle/>
+          <a:p>
+            <a:pPr algn="ctr"/>
+            <a:r>
+              <a:rPr lang="en-US" sz="1050" b="1" dirty="0" err="1">
+                <a:solidFill>
+                  <a:schemeClr val="accent6">
+                    <a:lumMod val="75000"/>
+                  </a:schemeClr>
+                </a:solidFill>
+              </a:rPr>
+              <a:t>XmlSerializable</a:t>
+            </a:r>
+            <a:br>
+              <a:rPr lang="en-US" sz="1050" b="1" dirty="0">
+                <a:solidFill>
+                  <a:schemeClr val="accent6">
+                    <a:lumMod val="75000"/>
+                  </a:schemeClr>
+                </a:solidFill>
+              </a:rPr>
+            </a:br>
+            <a:r>
+              <a:rPr lang="en-US" sz="1050" b="1" dirty="0" err="1">
+                <a:solidFill>
+                  <a:schemeClr val="accent6">
+                    <a:lumMod val="75000"/>
+                  </a:schemeClr>
+                </a:solidFill>
+              </a:rPr>
+              <a:t>ExpensesList</a:t>
+            </a:r>
+            <a:endParaRPr lang="en-SG" sz="1050" b="1" dirty="0">
+              <a:solidFill>
+                <a:schemeClr val="accent6">
+                  <a:lumMod val="75000"/>
+                </a:schemeClr>
+              </a:solidFill>
+            </a:endParaRPr>
+          </a:p>
+        </p:txBody>
+      </p:sp>
+      <p:sp>
+        <p:nvSpPr>
+          <p:cNvPr id="34" name="Rectangle 8">
+            <a:extLst>
+              <a:ext uri="{FF2B5EF4-FFF2-40B4-BE49-F238E27FC236}">
+                <a16:creationId xmlns:a16="http://schemas.microsoft.com/office/drawing/2014/main" id="{44624B88-9226-4496-9939-012AB1F5B54C}"/>
+              </a:ext>
+            </a:extLst>
+          </p:cNvPr>
+          <p:cNvSpPr/>
+          <p:nvPr/>
+        </p:nvSpPr>
+        <p:spPr>
+          <a:xfrm>
+            <a:off x="7333325" y="3811184"/>
+            <a:ext cx="1424340" cy="346760"/>
+          </a:xfrm>
+          <a:prstGeom prst="rect">
+            <a:avLst/>
+          </a:prstGeom>
+          <a:ln w="19050"/>
+          <a:effectLst/>
+        </p:spPr>
+        <p:style>
+          <a:lnRef idx="1">
+            <a:schemeClr val="accent6"/>
+          </a:lnRef>
+          <a:fillRef idx="2">
+            <a:schemeClr val="accent6"/>
+          </a:fillRef>
+          <a:effectRef idx="1">
+            <a:schemeClr val="accent6"/>
+          </a:effectRef>
+          <a:fontRef idx="minor">
+            <a:schemeClr val="dk1"/>
+          </a:fontRef>
+        </p:style>
+        <p:txBody>
+          <a:bodyPr rtlCol="0" anchor="ctr"/>
+          <a:lstStyle/>
+          <a:p>
+            <a:pPr algn="ctr"/>
+            <a:r>
+              <a:rPr lang="en-US" sz="1050" b="1" dirty="0" err="1">
+                <a:solidFill>
+                  <a:schemeClr val="accent6">
+                    <a:lumMod val="75000"/>
+                  </a:schemeClr>
+                </a:solidFill>
+              </a:rPr>
+              <a:t>XmlAdaptedExpenses</a:t>
+            </a:r>
+            <a:endParaRPr lang="en-SG" sz="1050" b="1" dirty="0">
+              <a:solidFill>
+                <a:schemeClr val="accent6">
+                  <a:lumMod val="75000"/>
+                </a:schemeClr>
+              </a:solidFill>
+            </a:endParaRPr>
+          </a:p>
+        </p:txBody>
+      </p:sp>
+      <p:cxnSp>
+        <p:nvCxnSpPr>
+          <p:cNvPr id="35" name="Elbow Connector 122">
+            <a:extLst>
+              <a:ext uri="{FF2B5EF4-FFF2-40B4-BE49-F238E27FC236}">
+                <a16:creationId xmlns:a16="http://schemas.microsoft.com/office/drawing/2014/main" id="{940AE4AC-1AAF-489F-B638-E4F58385558B}"/>
+              </a:ext>
+            </a:extLst>
+          </p:cNvPr>
+          <p:cNvCxnSpPr>
+            <a:cxnSpLocks/>
+            <a:stCxn id="33" idx="3"/>
+            <a:endCxn id="34" idx="1"/>
+          </p:cNvCxnSpPr>
+          <p:nvPr/>
+        </p:nvCxnSpPr>
+        <p:spPr>
+          <a:xfrm flipV="1">
+            <a:off x="6938094" y="3984564"/>
+            <a:ext cx="395231" cy="786"/>
+          </a:xfrm>
+          <a:prstGeom prst="bentConnector3">
+            <a:avLst>
+              <a:gd name="adj1" fmla="val 50000"/>
+            </a:avLst>
+          </a:prstGeom>
+          <a:ln w="19050">
+            <a:prstDash val="sysDot"/>
+            <a:headEnd type="none" w="med" len="med"/>
+            <a:tailEnd type="arrow" w="med" len="med"/>
+          </a:ln>
+          <a:effectLst/>
+        </p:spPr>
+        <p:style>
+          <a:lnRef idx="1">
+            <a:schemeClr val="accent6"/>
+          </a:lnRef>
+          <a:fillRef idx="2">
+            <a:schemeClr val="accent6"/>
+          </a:fillRef>
+          <a:effectRef idx="1">
+            <a:schemeClr val="accent6"/>
+          </a:effectRef>
+          <a:fontRef idx="minor">
+            <a:schemeClr val="dk1"/>
+          </a:fontRef>
+        </p:style>
+      </p:cxnSp>
+      <p:sp>
+        <p:nvSpPr>
+          <p:cNvPr id="47" name="Rectangle 8">
+            <a:extLst>
+              <a:ext uri="{FF2B5EF4-FFF2-40B4-BE49-F238E27FC236}">
+                <a16:creationId xmlns:a16="http://schemas.microsoft.com/office/drawing/2014/main" id="{DB753F17-7BC6-415B-8BD9-8F2860FBB1D0}"/>
+              </a:ext>
+            </a:extLst>
+          </p:cNvPr>
+          <p:cNvSpPr/>
+          <p:nvPr/>
+        </p:nvSpPr>
+        <p:spPr>
+          <a:xfrm>
+            <a:off x="2594767" y="4451870"/>
+            <a:ext cx="1323049" cy="346760"/>
+          </a:xfrm>
+          <a:prstGeom prst="rect">
+            <a:avLst/>
+          </a:prstGeom>
+          <a:solidFill>
+            <a:schemeClr val="accent6">
+              <a:lumMod val="75000"/>
+            </a:schemeClr>
+          </a:solidFill>
+          <a:ln w="19050">
+            <a:solidFill>
+              <a:schemeClr val="accent6">
+                <a:lumMod val="75000"/>
+              </a:schemeClr>
+            </a:solidFill>
+          </a:ln>
+          <a:effectLst/>
+        </p:spPr>
+        <p:style>
+          <a:lnRef idx="1">
+            <a:schemeClr val="accent2"/>
+          </a:lnRef>
+          <a:fillRef idx="2">
+            <a:schemeClr val="accent2"/>
+          </a:fillRef>
+          <a:effectRef idx="1">
+            <a:schemeClr val="accent2"/>
+          </a:effectRef>
+          <a:fontRef idx="minor">
+            <a:schemeClr val="dk1"/>
+          </a:fontRef>
+        </p:style>
+        <p:txBody>
+          <a:bodyPr rtlCol="0" anchor="ctr"/>
+          <a:lstStyle/>
+          <a:p>
+            <a:pPr algn="ctr"/>
+            <a:r>
+              <a:rPr lang="en-US" sz="1050" dirty="0">
+                <a:solidFill>
+                  <a:schemeClr val="bg1"/>
+                </a:solidFill>
+              </a:rPr>
+              <a:t>&lt;&lt;interface&gt;&gt;</a:t>
+            </a:r>
+            <a:br>
+              <a:rPr lang="en-US" sz="1050" dirty="0">
+                <a:solidFill>
+                  <a:schemeClr val="bg1"/>
+                </a:solidFill>
+              </a:rPr>
+            </a:br>
+            <a:r>
+              <a:rPr lang="en-US" sz="1050" dirty="0" err="1">
+                <a:solidFill>
+                  <a:schemeClr val="bg1"/>
+                </a:solidFill>
+              </a:rPr>
+              <a:t>ScheduleListStorage</a:t>
+            </a:r>
+            <a:endParaRPr lang="en-SG" sz="1050" dirty="0">
+              <a:solidFill>
+                <a:schemeClr val="bg1"/>
+              </a:solidFill>
+            </a:endParaRPr>
+          </a:p>
+        </p:txBody>
+      </p:sp>
+      <p:cxnSp>
+        <p:nvCxnSpPr>
+          <p:cNvPr id="48" name="Straight Arrow Connector 47">
+            <a:extLst>
+              <a:ext uri="{FF2B5EF4-FFF2-40B4-BE49-F238E27FC236}">
+                <a16:creationId xmlns:a16="http://schemas.microsoft.com/office/drawing/2014/main" id="{0C7C5A66-994D-4BD7-8EFE-FBBC89CF6E65}"/>
+              </a:ext>
+            </a:extLst>
+          </p:cNvPr>
+          <p:cNvCxnSpPr>
+            <a:stCxn id="49" idx="3"/>
+            <a:endCxn id="47" idx="1"/>
+          </p:cNvCxnSpPr>
+          <p:nvPr/>
+        </p:nvCxnSpPr>
+        <p:spPr>
+          <a:xfrm>
+            <a:off x="2373957" y="4619966"/>
+            <a:ext cx="220810" cy="5284"/>
+          </a:xfrm>
+          <a:prstGeom prst="straightConnector1">
+            <a:avLst/>
+          </a:prstGeom>
+          <a:ln w="19050">
+            <a:solidFill>
+              <a:schemeClr val="accent6">
+                <a:lumMod val="75000"/>
+              </a:schemeClr>
+            </a:solidFill>
+            <a:headEnd type="none" w="med" len="med"/>
+            <a:tailEnd type="arrow" w="med" len="med"/>
+          </a:ln>
+          <a:effectLst/>
+        </p:spPr>
+        <p:style>
+          <a:lnRef idx="1">
+            <a:schemeClr val="accent2"/>
+          </a:lnRef>
+          <a:fillRef idx="2">
+            <a:schemeClr val="accent2"/>
+          </a:fillRef>
+          <a:effectRef idx="1">
+            <a:schemeClr val="accent2"/>
+          </a:effectRef>
+          <a:fontRef idx="minor">
+            <a:schemeClr val="dk1"/>
+          </a:fontRef>
+        </p:style>
+      </p:cxnSp>
+      <p:sp>
+        <p:nvSpPr>
+          <p:cNvPr id="49" name="Flowchart: Decision 96">
+            <a:extLst>
+              <a:ext uri="{FF2B5EF4-FFF2-40B4-BE49-F238E27FC236}">
+                <a16:creationId xmlns:a16="http://schemas.microsoft.com/office/drawing/2014/main" id="{16D0218F-9BF3-480E-90B4-059B8CE645B1}"/>
+              </a:ext>
+            </a:extLst>
+          </p:cNvPr>
+          <p:cNvSpPr/>
+          <p:nvPr/>
+        </p:nvSpPr>
+        <p:spPr>
+          <a:xfrm>
+            <a:off x="2137909" y="4533276"/>
+            <a:ext cx="236048" cy="173380"/>
+          </a:xfrm>
+          <a:prstGeom prst="flowChartDecision">
+            <a:avLst/>
+          </a:prstGeom>
+          <a:noFill/>
+          <a:ln w="19050">
+            <a:solidFill>
+              <a:schemeClr val="accent6">
+                <a:lumMod val="75000"/>
+              </a:schemeClr>
+            </a:solidFill>
+          </a:ln>
+          <a:effectLst/>
+        </p:spPr>
+        <p:style>
+          <a:lnRef idx="1">
+            <a:schemeClr val="accent2"/>
+          </a:lnRef>
+          <a:fillRef idx="2">
+            <a:schemeClr val="accent2"/>
+          </a:fillRef>
+          <a:effectRef idx="1">
+            <a:schemeClr val="accent2"/>
+          </a:effectRef>
+          <a:fontRef idx="minor">
+            <a:schemeClr val="dk1"/>
+          </a:fontRef>
+        </p:style>
+        <p:txBody>
+          <a:bodyPr rtlCol="0" anchor="ctr"/>
+          <a:lstStyle/>
+          <a:p>
+            <a:pPr algn="ctr"/>
+            <a:endParaRPr lang="en-US" sz="1050">
+              <a:solidFill>
+                <a:schemeClr val="bg1"/>
+              </a:solidFill>
+            </a:endParaRPr>
+          </a:p>
+        </p:txBody>
+      </p:sp>
+      <p:cxnSp>
+        <p:nvCxnSpPr>
+          <p:cNvPr id="51" name="Elbow Connector 63">
+            <a:extLst>
+              <a:ext uri="{FF2B5EF4-FFF2-40B4-BE49-F238E27FC236}">
+                <a16:creationId xmlns:a16="http://schemas.microsoft.com/office/drawing/2014/main" id="{9D4CA652-2D5A-4499-8F84-61474C94146E}"/>
+              </a:ext>
+            </a:extLst>
+          </p:cNvPr>
+          <p:cNvCxnSpPr>
+            <a:stCxn id="53" idx="3"/>
+            <a:endCxn id="57" idx="1"/>
+          </p:cNvCxnSpPr>
+          <p:nvPr/>
+        </p:nvCxnSpPr>
+        <p:spPr>
+          <a:xfrm flipV="1">
+            <a:off x="4115628" y="4625250"/>
+            <a:ext cx="223324" cy="1"/>
+          </a:xfrm>
+          <a:prstGeom prst="bentConnector3">
+            <a:avLst>
+              <a:gd name="adj1" fmla="val 50000"/>
+            </a:avLst>
+          </a:prstGeom>
+          <a:ln w="19050">
+            <a:solidFill>
+              <a:schemeClr val="accent6">
+                <a:lumMod val="75000"/>
+              </a:schemeClr>
+            </a:solidFill>
+            <a:prstDash val="sysDot"/>
+            <a:headEnd type="none" w="med" len="med"/>
+            <a:tailEnd type="none" w="med" len="med"/>
+          </a:ln>
+          <a:effectLst/>
+        </p:spPr>
+        <p:style>
+          <a:lnRef idx="1">
+            <a:schemeClr val="accent2"/>
+          </a:lnRef>
+          <a:fillRef idx="2">
+            <a:schemeClr val="accent2"/>
+          </a:fillRef>
+          <a:effectRef idx="1">
+            <a:schemeClr val="accent2"/>
+          </a:effectRef>
+          <a:fontRef idx="minor">
+            <a:schemeClr val="dk1"/>
+          </a:fontRef>
+        </p:style>
+      </p:cxnSp>
+      <p:sp>
+        <p:nvSpPr>
+          <p:cNvPr id="53" name="Isosceles Triangle 102">
+            <a:extLst>
+              <a:ext uri="{FF2B5EF4-FFF2-40B4-BE49-F238E27FC236}">
+                <a16:creationId xmlns:a16="http://schemas.microsoft.com/office/drawing/2014/main" id="{F8B65B4E-E76C-405A-9619-F02169CB98BB}"/>
+              </a:ext>
+            </a:extLst>
+          </p:cNvPr>
+          <p:cNvSpPr/>
+          <p:nvPr/>
+        </p:nvSpPr>
+        <p:spPr>
+          <a:xfrm rot="5400000" flipV="1">
+            <a:off x="3892614" y="4537489"/>
+            <a:ext cx="270504" cy="175523"/>
+          </a:xfrm>
+          <a:prstGeom prst="triangle">
+            <a:avLst/>
+          </a:prstGeom>
+          <a:solidFill>
+            <a:schemeClr val="accent6">
+              <a:lumMod val="75000"/>
+            </a:schemeClr>
+          </a:solidFill>
+          <a:ln w="19050">
+            <a:solidFill>
+              <a:schemeClr val="accent6">
+                <a:lumMod val="75000"/>
+              </a:schemeClr>
+            </a:solidFill>
+          </a:ln>
+          <a:effectLst/>
+        </p:spPr>
+        <p:style>
+          <a:lnRef idx="1">
+            <a:schemeClr val="accent2"/>
+          </a:lnRef>
+          <a:fillRef idx="2">
+            <a:schemeClr val="accent2"/>
+          </a:fillRef>
+          <a:effectRef idx="1">
+            <a:schemeClr val="accent2"/>
+          </a:effectRef>
+          <a:fontRef idx="minor">
+            <a:schemeClr val="dk1"/>
+          </a:fontRef>
+        </p:style>
+        <p:txBody>
+          <a:bodyPr rtlCol="0" anchor="ctr"/>
+          <a:lstStyle/>
+          <a:p>
+            <a:pPr algn="ctr"/>
+            <a:endParaRPr lang="en-SG" sz="1050">
+              <a:solidFill>
+                <a:schemeClr val="bg1"/>
+              </a:solidFill>
+            </a:endParaRPr>
+          </a:p>
+        </p:txBody>
+      </p:sp>
+      <p:cxnSp>
+        <p:nvCxnSpPr>
+          <p:cNvPr id="55" name="Elbow Connector 122">
+            <a:extLst>
+              <a:ext uri="{FF2B5EF4-FFF2-40B4-BE49-F238E27FC236}">
+                <a16:creationId xmlns:a16="http://schemas.microsoft.com/office/drawing/2014/main" id="{2FD62FA7-1CE1-41B1-AA0E-728FBEEA0276}"/>
+              </a:ext>
+            </a:extLst>
+          </p:cNvPr>
+          <p:cNvCxnSpPr>
+            <a:stCxn id="57" idx="3"/>
+            <a:endCxn id="59" idx="1"/>
+          </p:cNvCxnSpPr>
+          <p:nvPr/>
+        </p:nvCxnSpPr>
+        <p:spPr>
+          <a:xfrm>
+            <a:off x="5508787" y="4625250"/>
+            <a:ext cx="228600" cy="1970"/>
+          </a:xfrm>
+          <a:prstGeom prst="bentConnector3">
+            <a:avLst>
+              <a:gd name="adj1" fmla="val 50000"/>
+            </a:avLst>
+          </a:prstGeom>
+          <a:ln w="19050">
+            <a:solidFill>
+              <a:schemeClr val="accent6">
+                <a:lumMod val="75000"/>
+              </a:schemeClr>
+            </a:solidFill>
+            <a:prstDash val="sysDot"/>
+            <a:headEnd type="none" w="med" len="med"/>
+            <a:tailEnd type="arrow" w="med" len="med"/>
+          </a:ln>
+          <a:effectLst/>
+        </p:spPr>
+        <p:style>
+          <a:lnRef idx="1">
+            <a:schemeClr val="accent2"/>
+          </a:lnRef>
+          <a:fillRef idx="2">
+            <a:schemeClr val="accent2"/>
+          </a:fillRef>
+          <a:effectRef idx="1">
+            <a:schemeClr val="accent2"/>
+          </a:effectRef>
+          <a:fontRef idx="minor">
+            <a:schemeClr val="dk1"/>
+          </a:fontRef>
+        </p:style>
+      </p:cxnSp>
+      <p:sp>
+        <p:nvSpPr>
+          <p:cNvPr id="57" name="Rectangle 8">
+            <a:extLst>
+              <a:ext uri="{FF2B5EF4-FFF2-40B4-BE49-F238E27FC236}">
+                <a16:creationId xmlns:a16="http://schemas.microsoft.com/office/drawing/2014/main" id="{AF02A902-B989-46AC-B32B-F3B3264BB2C7}"/>
+              </a:ext>
+            </a:extLst>
+          </p:cNvPr>
+          <p:cNvSpPr/>
+          <p:nvPr/>
+        </p:nvSpPr>
+        <p:spPr>
+          <a:xfrm>
+            <a:off x="4338952" y="4451870"/>
+            <a:ext cx="1169835" cy="346760"/>
+          </a:xfrm>
+          <a:prstGeom prst="rect">
+            <a:avLst/>
+          </a:prstGeom>
+          <a:ln w="19050"/>
+          <a:effectLst/>
+        </p:spPr>
+        <p:style>
+          <a:lnRef idx="1">
+            <a:schemeClr val="accent6"/>
+          </a:lnRef>
+          <a:fillRef idx="2">
+            <a:schemeClr val="accent6"/>
+          </a:fillRef>
+          <a:effectRef idx="1">
+            <a:schemeClr val="accent6"/>
+          </a:effectRef>
+          <a:fontRef idx="minor">
+            <a:schemeClr val="dk1"/>
+          </a:fontRef>
+        </p:style>
+        <p:txBody>
+          <a:bodyPr rtlCol="0" anchor="ctr"/>
+          <a:lstStyle/>
+          <a:p>
+            <a:pPr algn="ctr"/>
+            <a:r>
+              <a:rPr lang="en-US" sz="1050" b="1" dirty="0" err="1">
+                <a:solidFill>
+                  <a:schemeClr val="accent6">
+                    <a:lumMod val="75000"/>
+                  </a:schemeClr>
+                </a:solidFill>
+              </a:rPr>
+              <a:t>XmlScheduleList</a:t>
+            </a:r>
+            <a:br>
+              <a:rPr lang="en-US" sz="1050" b="1" dirty="0">
+                <a:solidFill>
+                  <a:schemeClr val="accent6">
+                    <a:lumMod val="75000"/>
+                  </a:schemeClr>
+                </a:solidFill>
+              </a:rPr>
+            </a:br>
+            <a:r>
+              <a:rPr lang="en-US" sz="1050" b="1" dirty="0">
+                <a:solidFill>
+                  <a:schemeClr val="accent6">
+                    <a:lumMod val="75000"/>
+                  </a:schemeClr>
+                </a:solidFill>
+              </a:rPr>
+              <a:t>Storage</a:t>
+            </a:r>
+            <a:endParaRPr lang="en-SG" sz="1050" b="1" dirty="0">
+              <a:solidFill>
+                <a:schemeClr val="accent6">
+                  <a:lumMod val="75000"/>
+                </a:schemeClr>
+              </a:solidFill>
+            </a:endParaRPr>
+          </a:p>
+        </p:txBody>
+      </p:sp>
+      <p:sp>
+        <p:nvSpPr>
+          <p:cNvPr id="59" name="Rectangle 8">
+            <a:extLst>
+              <a:ext uri="{FF2B5EF4-FFF2-40B4-BE49-F238E27FC236}">
+                <a16:creationId xmlns:a16="http://schemas.microsoft.com/office/drawing/2014/main" id="{583322DB-4E74-4472-8821-135D207A6B96}"/>
+              </a:ext>
+            </a:extLst>
+          </p:cNvPr>
+          <p:cNvSpPr/>
+          <p:nvPr/>
+        </p:nvSpPr>
+        <p:spPr>
+          <a:xfrm>
+            <a:off x="5737387" y="4453840"/>
+            <a:ext cx="1200707" cy="346760"/>
+          </a:xfrm>
+          <a:prstGeom prst="rect">
+            <a:avLst/>
+          </a:prstGeom>
+          <a:ln w="19050"/>
+          <a:effectLst/>
+        </p:spPr>
+        <p:style>
+          <a:lnRef idx="1">
+            <a:schemeClr val="accent6"/>
+          </a:lnRef>
+          <a:fillRef idx="2">
+            <a:schemeClr val="accent6"/>
+          </a:fillRef>
+          <a:effectRef idx="1">
+            <a:schemeClr val="accent6"/>
+          </a:effectRef>
+          <a:fontRef idx="minor">
+            <a:schemeClr val="dk1"/>
+          </a:fontRef>
+        </p:style>
+        <p:txBody>
+          <a:bodyPr rtlCol="0" anchor="ctr"/>
+          <a:lstStyle/>
+          <a:p>
+            <a:pPr algn="ctr"/>
+            <a:r>
+              <a:rPr lang="en-US" sz="1050" b="1" dirty="0" err="1">
+                <a:solidFill>
+                  <a:schemeClr val="accent6">
+                    <a:lumMod val="75000"/>
+                  </a:schemeClr>
+                </a:solidFill>
+              </a:rPr>
+              <a:t>XmlSerializable</a:t>
+            </a:r>
+            <a:br>
+              <a:rPr lang="en-US" sz="1050" b="1" dirty="0">
+                <a:solidFill>
+                  <a:schemeClr val="accent6">
+                    <a:lumMod val="75000"/>
+                  </a:schemeClr>
+                </a:solidFill>
+              </a:rPr>
+            </a:br>
+            <a:r>
+              <a:rPr lang="en-US" sz="1050" b="1" dirty="0" err="1">
+                <a:solidFill>
+                  <a:schemeClr val="accent6">
+                    <a:lumMod val="75000"/>
+                  </a:schemeClr>
+                </a:solidFill>
+              </a:rPr>
+              <a:t>ScheduleList</a:t>
+            </a:r>
+            <a:endParaRPr lang="en-SG" sz="1050" b="1" dirty="0">
+              <a:solidFill>
+                <a:schemeClr val="accent6">
+                  <a:lumMod val="75000"/>
+                </a:schemeClr>
+              </a:solidFill>
+            </a:endParaRPr>
+          </a:p>
+        </p:txBody>
+      </p:sp>
+      <p:sp>
+        <p:nvSpPr>
+          <p:cNvPr id="62" name="Rectangle 8">
+            <a:extLst>
+              <a:ext uri="{FF2B5EF4-FFF2-40B4-BE49-F238E27FC236}">
+                <a16:creationId xmlns:a16="http://schemas.microsoft.com/office/drawing/2014/main" id="{1E035DBD-C124-43CB-A83B-88D85252322B}"/>
+              </a:ext>
+            </a:extLst>
+          </p:cNvPr>
+          <p:cNvSpPr/>
+          <p:nvPr/>
+        </p:nvSpPr>
+        <p:spPr>
+          <a:xfrm>
+            <a:off x="7333325" y="4453054"/>
+            <a:ext cx="1424340" cy="346760"/>
+          </a:xfrm>
+          <a:prstGeom prst="rect">
+            <a:avLst/>
+          </a:prstGeom>
+          <a:ln w="19050"/>
+          <a:effectLst/>
+        </p:spPr>
+        <p:style>
+          <a:lnRef idx="1">
+            <a:schemeClr val="accent6"/>
+          </a:lnRef>
+          <a:fillRef idx="2">
+            <a:schemeClr val="accent6"/>
+          </a:fillRef>
+          <a:effectRef idx="1">
+            <a:schemeClr val="accent6"/>
+          </a:effectRef>
+          <a:fontRef idx="minor">
+            <a:schemeClr val="dk1"/>
+          </a:fontRef>
+        </p:style>
+        <p:txBody>
+          <a:bodyPr rtlCol="0" anchor="ctr"/>
+          <a:lstStyle/>
+          <a:p>
+            <a:pPr algn="ctr"/>
+            <a:r>
+              <a:rPr lang="en-US" sz="1050" b="1" dirty="0" err="1">
+                <a:solidFill>
+                  <a:schemeClr val="accent6">
+                    <a:lumMod val="75000"/>
+                  </a:schemeClr>
+                </a:solidFill>
+              </a:rPr>
+              <a:t>XmlAdaptedSchedule</a:t>
+            </a:r>
+            <a:endParaRPr lang="en-SG" sz="1050" b="1" dirty="0">
+              <a:solidFill>
+                <a:schemeClr val="accent6">
+                  <a:lumMod val="75000"/>
+                </a:schemeClr>
+              </a:solidFill>
+            </a:endParaRPr>
+          </a:p>
+        </p:txBody>
+      </p:sp>
+      <p:cxnSp>
+        <p:nvCxnSpPr>
+          <p:cNvPr id="63" name="Elbow Connector 122">
+            <a:extLst>
+              <a:ext uri="{FF2B5EF4-FFF2-40B4-BE49-F238E27FC236}">
+                <a16:creationId xmlns:a16="http://schemas.microsoft.com/office/drawing/2014/main" id="{3116510A-4BCC-4C18-AB04-4C421123E783}"/>
+              </a:ext>
+            </a:extLst>
+          </p:cNvPr>
+          <p:cNvCxnSpPr>
+            <a:cxnSpLocks/>
+            <a:stCxn id="59" idx="3"/>
+            <a:endCxn id="62" idx="1"/>
+          </p:cNvCxnSpPr>
+          <p:nvPr/>
+        </p:nvCxnSpPr>
+        <p:spPr>
+          <a:xfrm flipV="1">
+            <a:off x="6938094" y="4626434"/>
+            <a:ext cx="395231" cy="786"/>
+          </a:xfrm>
+          <a:prstGeom prst="bentConnector3">
+            <a:avLst>
+              <a:gd name="adj1" fmla="val 50000"/>
+            </a:avLst>
+          </a:prstGeom>
+          <a:ln w="19050">
+            <a:prstDash val="sysDot"/>
+            <a:headEnd type="none" w="med" len="med"/>
+            <a:tailEnd type="arrow" w="med" len="med"/>
+          </a:ln>
+          <a:effectLst/>
+        </p:spPr>
+        <p:style>
+          <a:lnRef idx="1">
+            <a:schemeClr val="accent6"/>
+          </a:lnRef>
+          <a:fillRef idx="2">
+            <a:schemeClr val="accent6"/>
+          </a:fillRef>
+          <a:effectRef idx="1">
+            <a:schemeClr val="accent6"/>
+          </a:effectRef>
+          <a:fontRef idx="minor">
+            <a:schemeClr val="dk1"/>
+          </a:fontRef>
+        </p:style>
+      </p:cxnSp>
+      <p:sp>
+        <p:nvSpPr>
+          <p:cNvPr id="64" name="Rectangle 8">
+            <a:extLst>
+              <a:ext uri="{FF2B5EF4-FFF2-40B4-BE49-F238E27FC236}">
+                <a16:creationId xmlns:a16="http://schemas.microsoft.com/office/drawing/2014/main" id="{51C625B8-8EEF-4586-95DB-ECDB90E7D28A}"/>
+              </a:ext>
+            </a:extLst>
+          </p:cNvPr>
+          <p:cNvSpPr/>
+          <p:nvPr/>
+        </p:nvSpPr>
+        <p:spPr>
+          <a:xfrm>
+            <a:off x="2518909" y="5061470"/>
+            <a:ext cx="1499546" cy="346760"/>
+          </a:xfrm>
+          <a:prstGeom prst="rect">
+            <a:avLst/>
+          </a:prstGeom>
+          <a:solidFill>
+            <a:schemeClr val="accent6">
+              <a:lumMod val="75000"/>
+            </a:schemeClr>
+          </a:solidFill>
+          <a:ln w="19050">
+            <a:solidFill>
+              <a:schemeClr val="accent6">
+                <a:lumMod val="75000"/>
+              </a:schemeClr>
+            </a:solidFill>
+          </a:ln>
+          <a:effectLst/>
+        </p:spPr>
+        <p:style>
+          <a:lnRef idx="1">
+            <a:schemeClr val="accent2"/>
+          </a:lnRef>
+          <a:fillRef idx="2">
+            <a:schemeClr val="accent2"/>
+          </a:fillRef>
+          <a:effectRef idx="1">
+            <a:schemeClr val="accent2"/>
+          </a:effectRef>
+          <a:fontRef idx="minor">
+            <a:schemeClr val="dk1"/>
+          </a:fontRef>
+        </p:style>
+        <p:txBody>
+          <a:bodyPr rtlCol="0" anchor="ctr"/>
+          <a:lstStyle/>
+          <a:p>
+            <a:pPr algn="ctr"/>
+            <a:r>
+              <a:rPr lang="en-US" sz="1050" dirty="0">
+                <a:solidFill>
+                  <a:schemeClr val="bg1"/>
+                </a:solidFill>
+              </a:rPr>
+              <a:t>&lt;&lt;interface&gt;&gt;</a:t>
+            </a:r>
+            <a:br>
+              <a:rPr lang="en-US" sz="1050" dirty="0">
+                <a:solidFill>
+                  <a:schemeClr val="bg1"/>
+                </a:solidFill>
+              </a:rPr>
+            </a:br>
+            <a:r>
+              <a:rPr lang="en-US" sz="1050" dirty="0" err="1">
+                <a:solidFill>
+                  <a:schemeClr val="bg1"/>
+                </a:solidFill>
+              </a:rPr>
+              <a:t>RecruitmentListStorage</a:t>
+            </a:r>
+            <a:endParaRPr lang="en-SG" sz="1050" dirty="0">
+              <a:solidFill>
+                <a:schemeClr val="bg1"/>
+              </a:solidFill>
+            </a:endParaRPr>
+          </a:p>
+        </p:txBody>
+      </p:sp>
+      <p:cxnSp>
+        <p:nvCxnSpPr>
+          <p:cNvPr id="67" name="Straight Arrow Connector 66">
+            <a:extLst>
+              <a:ext uri="{FF2B5EF4-FFF2-40B4-BE49-F238E27FC236}">
+                <a16:creationId xmlns:a16="http://schemas.microsoft.com/office/drawing/2014/main" id="{0A05EB4F-C7FD-486E-B8D6-3CC3F5C3BA15}"/>
+              </a:ext>
+            </a:extLst>
+          </p:cNvPr>
+          <p:cNvCxnSpPr>
+            <a:cxnSpLocks/>
+            <a:stCxn id="68" idx="3"/>
+          </p:cNvCxnSpPr>
+          <p:nvPr/>
+        </p:nvCxnSpPr>
+        <p:spPr>
+          <a:xfrm>
+            <a:off x="2373957" y="5229566"/>
+            <a:ext cx="140457" cy="0"/>
+          </a:xfrm>
+          <a:prstGeom prst="straightConnector1">
+            <a:avLst/>
+          </a:prstGeom>
+          <a:ln w="19050">
+            <a:solidFill>
+              <a:schemeClr val="accent6">
+                <a:lumMod val="75000"/>
+              </a:schemeClr>
+            </a:solidFill>
+            <a:headEnd type="none" w="med" len="med"/>
+            <a:tailEnd type="arrow" w="med" len="med"/>
+          </a:ln>
+          <a:effectLst/>
+        </p:spPr>
+        <p:style>
+          <a:lnRef idx="1">
+            <a:schemeClr val="accent2"/>
+          </a:lnRef>
+          <a:fillRef idx="2">
+            <a:schemeClr val="accent2"/>
+          </a:fillRef>
+          <a:effectRef idx="1">
+            <a:schemeClr val="accent2"/>
+          </a:effectRef>
+          <a:fontRef idx="minor">
+            <a:schemeClr val="dk1"/>
+          </a:fontRef>
+        </p:style>
+      </p:cxnSp>
+      <p:sp>
+        <p:nvSpPr>
+          <p:cNvPr id="68" name="Flowchart: Decision 96">
+            <a:extLst>
+              <a:ext uri="{FF2B5EF4-FFF2-40B4-BE49-F238E27FC236}">
+                <a16:creationId xmlns:a16="http://schemas.microsoft.com/office/drawing/2014/main" id="{10BB91D4-A956-44F9-9D06-22A469FB3667}"/>
+              </a:ext>
+            </a:extLst>
+          </p:cNvPr>
+          <p:cNvSpPr/>
+          <p:nvPr/>
+        </p:nvSpPr>
+        <p:spPr>
+          <a:xfrm>
+            <a:off x="2137909" y="5142876"/>
+            <a:ext cx="236048" cy="173380"/>
+          </a:xfrm>
+          <a:prstGeom prst="flowChartDecision">
+            <a:avLst/>
+          </a:prstGeom>
+          <a:noFill/>
+          <a:ln w="19050">
+            <a:solidFill>
+              <a:schemeClr val="accent6">
+                <a:lumMod val="75000"/>
+              </a:schemeClr>
+            </a:solidFill>
+          </a:ln>
+          <a:effectLst/>
+        </p:spPr>
+        <p:style>
+          <a:lnRef idx="1">
+            <a:schemeClr val="accent2"/>
+          </a:lnRef>
+          <a:fillRef idx="2">
+            <a:schemeClr val="accent2"/>
+          </a:fillRef>
+          <a:effectRef idx="1">
+            <a:schemeClr val="accent2"/>
+          </a:effectRef>
+          <a:fontRef idx="minor">
+            <a:schemeClr val="dk1"/>
+          </a:fontRef>
+        </p:style>
+        <p:txBody>
+          <a:bodyPr rtlCol="0" anchor="ctr"/>
+          <a:lstStyle/>
+          <a:p>
+            <a:pPr algn="ctr"/>
+            <a:endParaRPr lang="en-US" sz="1050">
+              <a:solidFill>
+                <a:schemeClr val="bg1"/>
+              </a:solidFill>
+            </a:endParaRPr>
+          </a:p>
+        </p:txBody>
+      </p:sp>
+      <p:cxnSp>
+        <p:nvCxnSpPr>
+          <p:cNvPr id="69" name="Elbow Connector 63">
+            <a:extLst>
+              <a:ext uri="{FF2B5EF4-FFF2-40B4-BE49-F238E27FC236}">
+                <a16:creationId xmlns:a16="http://schemas.microsoft.com/office/drawing/2014/main" id="{D8BE73C6-72D4-47D0-B481-E6901BEE93D3}"/>
+              </a:ext>
+            </a:extLst>
+          </p:cNvPr>
+          <p:cNvCxnSpPr>
+            <a:cxnSpLocks/>
+            <a:stCxn id="71" idx="3"/>
+            <a:endCxn id="76" idx="1"/>
+          </p:cNvCxnSpPr>
+          <p:nvPr/>
+        </p:nvCxnSpPr>
+        <p:spPr>
+          <a:xfrm flipV="1">
+            <a:off x="4195309" y="5234850"/>
+            <a:ext cx="201765" cy="3"/>
+          </a:xfrm>
+          <a:prstGeom prst="bentConnector3">
+            <a:avLst>
+              <a:gd name="adj1" fmla="val 50000"/>
+            </a:avLst>
+          </a:prstGeom>
+          <a:ln w="19050">
+            <a:solidFill>
+              <a:schemeClr val="accent6">
+                <a:lumMod val="75000"/>
+              </a:schemeClr>
+            </a:solidFill>
+            <a:prstDash val="sysDot"/>
+            <a:headEnd type="none" w="med" len="med"/>
+            <a:tailEnd type="none" w="med" len="med"/>
+          </a:ln>
+          <a:effectLst/>
+        </p:spPr>
+        <p:style>
+          <a:lnRef idx="1">
+            <a:schemeClr val="accent2"/>
+          </a:lnRef>
+          <a:fillRef idx="2">
+            <a:schemeClr val="accent2"/>
+          </a:fillRef>
+          <a:effectRef idx="1">
+            <a:schemeClr val="accent2"/>
+          </a:effectRef>
+          <a:fontRef idx="minor">
+            <a:schemeClr val="dk1"/>
+          </a:fontRef>
+        </p:style>
+      </p:cxnSp>
+      <p:sp>
+        <p:nvSpPr>
+          <p:cNvPr id="71" name="Isosceles Triangle 102">
+            <a:extLst>
+              <a:ext uri="{FF2B5EF4-FFF2-40B4-BE49-F238E27FC236}">
+                <a16:creationId xmlns:a16="http://schemas.microsoft.com/office/drawing/2014/main" id="{782B39F9-C504-40EC-ABF0-BFC75E18E031}"/>
+              </a:ext>
+            </a:extLst>
+          </p:cNvPr>
+          <p:cNvSpPr/>
+          <p:nvPr/>
+        </p:nvSpPr>
+        <p:spPr>
+          <a:xfrm rot="5400000" flipV="1">
+            <a:off x="3972295" y="5147091"/>
+            <a:ext cx="270504" cy="175523"/>
+          </a:xfrm>
+          <a:prstGeom prst="triangle">
+            <a:avLst/>
+          </a:prstGeom>
+          <a:solidFill>
+            <a:schemeClr val="accent6">
+              <a:lumMod val="75000"/>
+            </a:schemeClr>
+          </a:solidFill>
+          <a:ln w="19050">
+            <a:solidFill>
+              <a:schemeClr val="accent6">
+                <a:lumMod val="75000"/>
+              </a:schemeClr>
+            </a:solidFill>
+          </a:ln>
+          <a:effectLst/>
+        </p:spPr>
+        <p:style>
+          <a:lnRef idx="1">
+            <a:schemeClr val="accent2"/>
+          </a:lnRef>
+          <a:fillRef idx="2">
+            <a:schemeClr val="accent2"/>
+          </a:fillRef>
+          <a:effectRef idx="1">
+            <a:schemeClr val="accent2"/>
+          </a:effectRef>
+          <a:fontRef idx="minor">
+            <a:schemeClr val="dk1"/>
+          </a:fontRef>
+        </p:style>
+        <p:txBody>
+          <a:bodyPr rtlCol="0" anchor="ctr"/>
+          <a:lstStyle/>
+          <a:p>
+            <a:pPr algn="ctr"/>
+            <a:endParaRPr lang="en-SG" sz="1050">
+              <a:solidFill>
+                <a:schemeClr val="bg1"/>
+              </a:solidFill>
+            </a:endParaRPr>
+          </a:p>
+        </p:txBody>
+      </p:sp>
+      <p:cxnSp>
+        <p:nvCxnSpPr>
+          <p:cNvPr id="72" name="Elbow Connector 122">
+            <a:extLst>
+              <a:ext uri="{FF2B5EF4-FFF2-40B4-BE49-F238E27FC236}">
+                <a16:creationId xmlns:a16="http://schemas.microsoft.com/office/drawing/2014/main" id="{BF477959-E0AF-46A1-A7CC-DC28F34B5E75}"/>
+              </a:ext>
+            </a:extLst>
+          </p:cNvPr>
+          <p:cNvCxnSpPr>
+            <a:cxnSpLocks/>
+            <a:endCxn id="78" idx="1"/>
+          </p:cNvCxnSpPr>
+          <p:nvPr/>
+        </p:nvCxnSpPr>
+        <p:spPr>
+          <a:xfrm>
+            <a:off x="5605009" y="5229566"/>
+            <a:ext cx="132378" cy="7254"/>
+          </a:xfrm>
+          <a:prstGeom prst="bentConnector3">
+            <a:avLst>
+              <a:gd name="adj1" fmla="val 50000"/>
+            </a:avLst>
+          </a:prstGeom>
+          <a:ln w="19050">
+            <a:solidFill>
+              <a:schemeClr val="accent6">
+                <a:lumMod val="75000"/>
+              </a:schemeClr>
+            </a:solidFill>
+            <a:prstDash val="sysDot"/>
+            <a:headEnd type="none" w="med" len="med"/>
+            <a:tailEnd type="arrow" w="med" len="med"/>
+          </a:ln>
+          <a:effectLst/>
+        </p:spPr>
+        <p:style>
+          <a:lnRef idx="1">
+            <a:schemeClr val="accent2"/>
+          </a:lnRef>
+          <a:fillRef idx="2">
+            <a:schemeClr val="accent2"/>
+          </a:fillRef>
+          <a:effectRef idx="1">
+            <a:schemeClr val="accent2"/>
+          </a:effectRef>
+          <a:fontRef idx="minor">
+            <a:schemeClr val="dk1"/>
+          </a:fontRef>
+        </p:style>
+      </p:cxnSp>
+      <p:sp>
+        <p:nvSpPr>
+          <p:cNvPr id="76" name="Rectangle 8">
+            <a:extLst>
+              <a:ext uri="{FF2B5EF4-FFF2-40B4-BE49-F238E27FC236}">
+                <a16:creationId xmlns:a16="http://schemas.microsoft.com/office/drawing/2014/main" id="{93A2F320-A442-4DEB-B404-4B85851EE1A9}"/>
+              </a:ext>
+            </a:extLst>
+          </p:cNvPr>
+          <p:cNvSpPr/>
+          <p:nvPr/>
+        </p:nvSpPr>
+        <p:spPr>
+          <a:xfrm>
+            <a:off x="4397074" y="5061470"/>
+            <a:ext cx="1169835" cy="346760"/>
+          </a:xfrm>
+          <a:prstGeom prst="rect">
+            <a:avLst/>
+          </a:prstGeom>
+          <a:ln w="19050"/>
+          <a:effectLst/>
+        </p:spPr>
+        <p:style>
+          <a:lnRef idx="1">
+            <a:schemeClr val="accent6"/>
+          </a:lnRef>
+          <a:fillRef idx="2">
+            <a:schemeClr val="accent6"/>
+          </a:fillRef>
+          <a:effectRef idx="1">
+            <a:schemeClr val="accent6"/>
+          </a:effectRef>
+          <a:fontRef idx="minor">
+            <a:schemeClr val="dk1"/>
+          </a:fontRef>
+        </p:style>
+        <p:txBody>
+          <a:bodyPr rtlCol="0" anchor="ctr"/>
+          <a:lstStyle/>
+          <a:p>
+            <a:pPr algn="ctr"/>
+            <a:r>
+              <a:rPr lang="en-US" sz="1050" b="1" dirty="0" err="1">
+                <a:solidFill>
+                  <a:schemeClr val="accent6">
+                    <a:lumMod val="75000"/>
+                  </a:schemeClr>
+                </a:solidFill>
+              </a:rPr>
+              <a:t>XmlRecruitment</a:t>
+            </a:r>
+            <a:r>
+              <a:rPr lang="en-US" sz="1050" b="1" dirty="0">
+                <a:solidFill>
+                  <a:schemeClr val="accent6">
+                    <a:lumMod val="75000"/>
+                  </a:schemeClr>
+                </a:solidFill>
+              </a:rPr>
+              <a:t> </a:t>
+            </a:r>
+            <a:r>
+              <a:rPr lang="en-US" sz="1050" b="1" dirty="0" err="1">
+                <a:solidFill>
+                  <a:schemeClr val="accent6">
+                    <a:lumMod val="75000"/>
+                  </a:schemeClr>
+                </a:solidFill>
+              </a:rPr>
+              <a:t>ListStorage</a:t>
+            </a:r>
+            <a:endParaRPr lang="en-SG" sz="1050" b="1" dirty="0">
+              <a:solidFill>
+                <a:schemeClr val="accent6">
+                  <a:lumMod val="75000"/>
+                </a:schemeClr>
+              </a:solidFill>
+            </a:endParaRPr>
+          </a:p>
+        </p:txBody>
+      </p:sp>
+      <p:sp>
+        <p:nvSpPr>
+          <p:cNvPr id="78" name="Rectangle 8">
+            <a:extLst>
+              <a:ext uri="{FF2B5EF4-FFF2-40B4-BE49-F238E27FC236}">
+                <a16:creationId xmlns:a16="http://schemas.microsoft.com/office/drawing/2014/main" id="{7D309545-4EDF-4506-A0D6-F448A8E6B8DE}"/>
+              </a:ext>
+            </a:extLst>
+          </p:cNvPr>
+          <p:cNvSpPr/>
+          <p:nvPr/>
+        </p:nvSpPr>
+        <p:spPr>
+          <a:xfrm>
+            <a:off x="5737387" y="5063440"/>
+            <a:ext cx="1200707" cy="346760"/>
+          </a:xfrm>
+          <a:prstGeom prst="rect">
+            <a:avLst/>
+          </a:prstGeom>
+          <a:ln w="19050"/>
+          <a:effectLst/>
+        </p:spPr>
+        <p:style>
+          <a:lnRef idx="1">
+            <a:schemeClr val="accent6"/>
+          </a:lnRef>
+          <a:fillRef idx="2">
+            <a:schemeClr val="accent6"/>
+          </a:fillRef>
+          <a:effectRef idx="1">
+            <a:schemeClr val="accent6"/>
+          </a:effectRef>
+          <a:fontRef idx="minor">
+            <a:schemeClr val="dk1"/>
+          </a:fontRef>
+        </p:style>
+        <p:txBody>
+          <a:bodyPr rtlCol="0" anchor="ctr"/>
+          <a:lstStyle/>
+          <a:p>
+            <a:pPr algn="ctr"/>
+            <a:r>
+              <a:rPr lang="en-US" sz="1050" b="1" dirty="0" err="1">
+                <a:solidFill>
+                  <a:schemeClr val="accent6">
+                    <a:lumMod val="75000"/>
+                  </a:schemeClr>
+                </a:solidFill>
+              </a:rPr>
+              <a:t>XmlSerializable</a:t>
+            </a:r>
+            <a:br>
+              <a:rPr lang="en-US" sz="1050" b="1" dirty="0">
+                <a:solidFill>
+                  <a:schemeClr val="accent6">
+                    <a:lumMod val="75000"/>
+                  </a:schemeClr>
+                </a:solidFill>
+              </a:rPr>
+            </a:br>
+            <a:r>
+              <a:rPr lang="en-US" sz="1050" b="1" dirty="0" err="1">
+                <a:solidFill>
+                  <a:schemeClr val="accent6">
+                    <a:lumMod val="75000"/>
+                  </a:schemeClr>
+                </a:solidFill>
+              </a:rPr>
+              <a:t>RecruitmentList</a:t>
+            </a:r>
+            <a:endParaRPr lang="en-SG" sz="1050" b="1" dirty="0">
+              <a:solidFill>
+                <a:schemeClr val="accent6">
+                  <a:lumMod val="75000"/>
+                </a:schemeClr>
+              </a:solidFill>
+            </a:endParaRPr>
+          </a:p>
+        </p:txBody>
+      </p:sp>
+      <p:sp>
+        <p:nvSpPr>
+          <p:cNvPr id="79" name="Rectangle 8">
+            <a:extLst>
+              <a:ext uri="{FF2B5EF4-FFF2-40B4-BE49-F238E27FC236}">
+                <a16:creationId xmlns:a16="http://schemas.microsoft.com/office/drawing/2014/main" id="{69EB90EB-762E-4B31-8C30-DC271C4C95EB}"/>
+              </a:ext>
+            </a:extLst>
+          </p:cNvPr>
+          <p:cNvSpPr/>
+          <p:nvPr/>
+        </p:nvSpPr>
+        <p:spPr>
+          <a:xfrm>
+            <a:off x="7147869" y="5062654"/>
+            <a:ext cx="1695640" cy="346760"/>
+          </a:xfrm>
+          <a:prstGeom prst="rect">
+            <a:avLst/>
+          </a:prstGeom>
+          <a:ln w="19050"/>
+          <a:effectLst/>
+        </p:spPr>
+        <p:style>
+          <a:lnRef idx="1">
+            <a:schemeClr val="accent6"/>
+          </a:lnRef>
+          <a:fillRef idx="2">
+            <a:schemeClr val="accent6"/>
+          </a:fillRef>
+          <a:effectRef idx="1">
+            <a:schemeClr val="accent6"/>
+          </a:effectRef>
+          <a:fontRef idx="minor">
+            <a:schemeClr val="dk1"/>
+          </a:fontRef>
+        </p:style>
+        <p:txBody>
+          <a:bodyPr rtlCol="0" anchor="ctr"/>
+          <a:lstStyle/>
+          <a:p>
+            <a:pPr algn="ctr"/>
+            <a:r>
+              <a:rPr lang="en-US" sz="1050" b="1" dirty="0" err="1">
+                <a:solidFill>
+                  <a:schemeClr val="accent6">
+                    <a:lumMod val="75000"/>
+                  </a:schemeClr>
+                </a:solidFill>
+              </a:rPr>
+              <a:t>XmlAdaptedRecruitment</a:t>
+            </a:r>
+            <a:endParaRPr lang="en-SG" sz="1050" b="1" dirty="0">
+              <a:solidFill>
+                <a:schemeClr val="accent6">
+                  <a:lumMod val="75000"/>
+                </a:schemeClr>
+              </a:solidFill>
+            </a:endParaRPr>
+          </a:p>
+        </p:txBody>
+      </p:sp>
+      <p:cxnSp>
+        <p:nvCxnSpPr>
+          <p:cNvPr id="80" name="Elbow Connector 122">
+            <a:extLst>
+              <a:ext uri="{FF2B5EF4-FFF2-40B4-BE49-F238E27FC236}">
+                <a16:creationId xmlns:a16="http://schemas.microsoft.com/office/drawing/2014/main" id="{0163E0DC-7031-4ECB-84AA-59FA555CA5E5}"/>
+              </a:ext>
+            </a:extLst>
+          </p:cNvPr>
+          <p:cNvCxnSpPr>
+            <a:cxnSpLocks/>
+            <a:stCxn id="78" idx="3"/>
+          </p:cNvCxnSpPr>
+          <p:nvPr/>
+        </p:nvCxnSpPr>
+        <p:spPr>
+          <a:xfrm flipV="1">
+            <a:off x="6938094" y="5229566"/>
+            <a:ext cx="209774" cy="7254"/>
           </a:xfrm>
           <a:prstGeom prst="bentConnector3">
             <a:avLst>
@@ -4843,13 +6691,6 @@
   <p:clrMapOvr>
     <a:masterClrMapping/>
   </p:clrMapOvr>
-  <p:timing>
-    <p:tnLst>
-      <p:par>
-        <p:cTn id="1" dur="indefinite" restart="never" nodeType="tmRoot"/>
-      </p:par>
-    </p:tnLst>
-  </p:timing>
 </p:sld>
 </file>
 

</xml_diff>